<commit_message>
minor experiment with grad norm and clipping
</commit_message>
<xml_diff>
--- a/notes/2024 12 25 experiment 2.pptx
+++ b/notes/2024 12 25 experiment 2.pptx
@@ -5,11 +5,12 @@
     <p:sldMasterId id="2147483648" r:id="rId1"/>
   </p:sldMasterIdLst>
   <p:notesMasterIdLst>
-    <p:notesMasterId r:id="rId4"/>
+    <p:notesMasterId r:id="rId5"/>
   </p:notesMasterIdLst>
   <p:sldIdLst>
     <p:sldId id="257" r:id="rId2"/>
     <p:sldId id="256" r:id="rId3"/>
+    <p:sldId id="258" r:id="rId4"/>
   </p:sldIdLst>
   <p:sldSz cx="12192000" cy="6858000"/>
   <p:notesSz cx="6858000" cy="9144000"/>
@@ -3804,19 +3805,29 @@
         </p:nvSpPr>
         <p:spPr/>
         <p:txBody>
-          <a:bodyPr/>
+          <a:bodyPr>
+            <a:normAutofit lnSpcReduction="10000"/>
+          </a:bodyPr>
           <a:lstStyle/>
           <a:p>
             <a:r>
               <a:rPr lang="en-US" dirty="0"/>
-              <a:t>synthetic language: N tokens, randomly sampled from int {0..v}</a:t>
+              <a:t>synthetic language: </a:t>
+            </a:r>
+            <a:r>
+              <a:rPr lang="en-US" dirty="0" err="1"/>
+              <a:t>len</a:t>
+            </a:r>
+            <a:r>
+              <a:rPr lang="en-US" dirty="0"/>
+              <a:t>=N tokens, randomly sampled from int {0..v}</a:t>
             </a:r>
           </a:p>
           <a:p>
             <a:pPr lvl="1"/>
             <a:r>
               <a:rPr lang="en-US" dirty="0"/>
-              <a:t>last token is always EOS=0, end of sequence</a:t>
+              <a:t>last token is always EOU=0, end of utterance</a:t>
             </a:r>
           </a:p>
           <a:p>
@@ -3850,7 +3861,7 @@
           <a:p>
             <a:r>
               <a:rPr lang="en-US" dirty="0"/>
-              <a:t>model architecture: 2 transformer layers, each single head; with MLP head for binary classification on top</a:t>
+              <a:t>model architecture: 2 transformer layers, each single head; with MLP head for binary classification on top of layer 2 EOU.</a:t>
             </a:r>
           </a:p>
           <a:p>
@@ -4978,7 +4989,7 @@
         <p:spPr>
           <a:xfrm>
             <a:off x="4202390" y="6341950"/>
-            <a:ext cx="466923" cy="276999"/>
+            <a:ext cx="484556" cy="276999"/>
           </a:xfrm>
           <a:prstGeom prst="rect">
             <a:avLst/>
@@ -4993,7 +5004,7 @@
           <a:p>
             <a:r>
               <a:rPr lang="en-US" sz="1200" dirty="0"/>
-              <a:t>EOS</a:t>
+              <a:t>EOU</a:t>
             </a:r>
           </a:p>
         </p:txBody>
@@ -5741,7 +5752,7 @@
         <p:spPr>
           <a:xfrm>
             <a:off x="4972046" y="3314986"/>
-            <a:ext cx="857542" cy="276999"/>
+            <a:ext cx="875176" cy="276999"/>
           </a:xfrm>
           <a:prstGeom prst="rect">
             <a:avLst/>
@@ -5758,7 +5769,7 @@
           <a:p>
             <a:r>
               <a:rPr lang="en-US" sz="1200" dirty="0"/>
-              <a:t>EOS value</a:t>
+              <a:t>EOU value</a:t>
             </a:r>
           </a:p>
         </p:txBody>
@@ -6195,7 +6206,7 @@
         <p:spPr>
           <a:xfrm>
             <a:off x="4761518" y="1669864"/>
-            <a:ext cx="876394" cy="276999"/>
+            <a:ext cx="894027" cy="276999"/>
           </a:xfrm>
           <a:prstGeom prst="rect">
             <a:avLst/>
@@ -6212,7 +6223,7 @@
           <a:p>
             <a:r>
               <a:rPr lang="en-US" sz="1200" dirty="0"/>
-              <a:t>EOS query</a:t>
+              <a:t>EOU query</a:t>
             </a:r>
           </a:p>
         </p:txBody>
@@ -7068,7 +7079,7 @@
         <p:spPr>
           <a:xfrm>
             <a:off x="4406741" y="591563"/>
-            <a:ext cx="1392625" cy="646331"/>
+            <a:ext cx="1445524" cy="646331"/>
           </a:xfrm>
           <a:prstGeom prst="rect">
             <a:avLst/>
@@ -7085,7 +7096,7 @@
           <a:p>
             <a:r>
               <a:rPr lang="en-US" sz="1200" dirty="0"/>
-              <a:t>EOS value</a:t>
+              <a:t>EOU value</a:t>
             </a:r>
             <a:br>
               <a:rPr lang="en-US" sz="1200" dirty="0"/>
@@ -7098,7 +7109,7 @@
           <a:p>
             <a:r>
               <a:rPr lang="en-US" sz="1200" b="1" dirty="0"/>
-              <a:t>=T1 and T2-aware</a:t>
+              <a:t>=T1- and T2-aware</a:t>
             </a:r>
           </a:p>
         </p:txBody>
@@ -7533,7 +7544,7 @@
         <p:spPr>
           <a:xfrm>
             <a:off x="2698738" y="1099796"/>
-            <a:ext cx="763735" cy="276999"/>
+            <a:ext cx="781368" cy="276999"/>
           </a:xfrm>
           <a:prstGeom prst="rect">
             <a:avLst/>
@@ -7550,7 +7561,7 @@
           <a:p>
             <a:r>
               <a:rPr lang="en-US" sz="1200" dirty="0"/>
-              <a:t>EOS attn</a:t>
+              <a:t>EOU attn</a:t>
             </a:r>
           </a:p>
         </p:txBody>
@@ -8062,7 +8073,7 @@
           <p:nvPr/>
         </p:nvGrpSpPr>
         <p:grpSpPr>
-          <a:xfrm rot="4670946">
+          <a:xfrm rot="5400000">
             <a:off x="1791961" y="3004603"/>
             <a:ext cx="80433" cy="524933"/>
             <a:chOff x="876300" y="3429000"/>
@@ -8901,7 +8912,7 @@
             </a:pPr>
             <a:r>
               <a:rPr lang="en-US" sz="1400" dirty="0"/>
-              <a:t>EOS • T2, where T2 is T1-aware</a:t>
+              <a:t>EOU • T2, where T2 is T1-aware</a:t>
             </a:r>
           </a:p>
           <a:p>
@@ -8911,7 +8922,7 @@
             </a:pPr>
             <a:r>
               <a:rPr lang="en-US" sz="1400" dirty="0"/>
-              <a:t>EOS • T1, where T1 is T2-aware</a:t>
+              <a:t>EOU • T1, where T1 is T2-aware</a:t>
             </a:r>
           </a:p>
           <a:p>
@@ -8921,7 +8932,7 @@
             </a:pPr>
             <a:r>
               <a:rPr lang="en-US" sz="1400" dirty="0"/>
-              <a:t>EOS • T1 • T2</a:t>
+              <a:t>EOU • T1 • T2</a:t>
             </a:r>
           </a:p>
           <a:p>
@@ -8956,6 +8967,119 @@
     <p:extLst>
       <p:ext uri="{BB962C8B-B14F-4D97-AF65-F5344CB8AC3E}">
         <p14:creationId xmlns:p14="http://schemas.microsoft.com/office/powerpoint/2010/main" val="2425989425"/>
+      </p:ext>
+    </p:extLst>
+  </p:cSld>
+  <p:clrMapOvr>
+    <a:masterClrMapping/>
+  </p:clrMapOvr>
+</p:sld>
+</file>
+
+<file path=ppt/slides/slide3.xml><?xml version="1.0" encoding="utf-8"?>
+<p:sld xmlns:a="http://schemas.openxmlformats.org/drawingml/2006/main" xmlns:r="http://schemas.openxmlformats.org/officeDocument/2006/relationships" xmlns:p="http://schemas.openxmlformats.org/presentationml/2006/main">
+  <p:cSld>
+    <p:spTree>
+      <p:nvGrpSpPr>
+        <p:cNvPr id="1" name=""/>
+        <p:cNvGrpSpPr/>
+        <p:nvPr/>
+      </p:nvGrpSpPr>
+      <p:grpSpPr>
+        <a:xfrm>
+          <a:off x="0" y="0"/>
+          <a:ext cx="0" cy="0"/>
+          <a:chOff x="0" y="0"/>
+          <a:chExt cx="0" cy="0"/>
+        </a:xfrm>
+      </p:grpSpPr>
+      <p:sp>
+        <p:nvSpPr>
+          <p:cNvPr id="2" name="Title 1">
+            <a:extLst>
+              <a:ext uri="{FF2B5EF4-FFF2-40B4-BE49-F238E27FC236}">
+                <a16:creationId xmlns:a16="http://schemas.microsoft.com/office/drawing/2014/main" id="{8BF470D1-4F99-8612-B6E6-1AE8D102D925}"/>
+              </a:ext>
+            </a:extLst>
+          </p:cNvPr>
+          <p:cNvSpPr>
+            <a:spLocks noGrp="1"/>
+          </p:cNvSpPr>
+          <p:nvPr>
+            <p:ph type="title"/>
+          </p:nvPr>
+        </p:nvSpPr>
+        <p:spPr/>
+        <p:txBody>
+          <a:bodyPr/>
+          <a:lstStyle/>
+          <a:p>
+            <a:r>
+              <a:rPr lang="en-US" dirty="0"/>
+              <a:t>How to fix</a:t>
+            </a:r>
+          </a:p>
+        </p:txBody>
+      </p:sp>
+      <p:sp>
+        <p:nvSpPr>
+          <p:cNvPr id="3" name="Content Placeholder 2">
+            <a:extLst>
+              <a:ext uri="{FF2B5EF4-FFF2-40B4-BE49-F238E27FC236}">
+                <a16:creationId xmlns:a16="http://schemas.microsoft.com/office/drawing/2014/main" id="{C053CFAD-7BB6-5062-DD25-32343272AA42}"/>
+              </a:ext>
+            </a:extLst>
+          </p:cNvPr>
+          <p:cNvSpPr>
+            <a:spLocks noGrp="1"/>
+          </p:cNvSpPr>
+          <p:nvPr>
+            <p:ph idx="1"/>
+          </p:nvPr>
+        </p:nvSpPr>
+        <p:spPr/>
+        <p:txBody>
+          <a:bodyPr/>
+          <a:lstStyle/>
+          <a:p>
+            <a:r>
+              <a:rPr lang="en-US" dirty="0"/>
+              <a:t>? warm up for a few iterations, then take unions of attentions</a:t>
+            </a:r>
+          </a:p>
+          <a:p>
+            <a:r>
+              <a:rPr lang="en-US" dirty="0"/>
+              <a:t>multi-head, by groups. Take union of groups of attentions. When attentions develop to &gt;0.5, start phase out all but 1 head in such groups each group</a:t>
+            </a:r>
+          </a:p>
+          <a:p>
+            <a:pPr lvl="1"/>
+            <a:r>
+              <a:rPr lang="en-US" dirty="0"/>
+              <a:t>intuition:</a:t>
+            </a:r>
+          </a:p>
+          <a:p>
+            <a:pPr lvl="2"/>
+            <a:r>
+              <a:rPr lang="en-US" dirty="0"/>
+              <a:t>in the initial, warmup phase all information paths will develop in all heads because of the union of attentions</a:t>
+            </a:r>
+          </a:p>
+          <a:p>
+            <a:pPr lvl="2"/>
+            <a:r>
+              <a:rPr lang="en-US" dirty="0"/>
+              <a:t>Once strong, consistent attentions develop, start gradual phase out by shifting “weight” onto 1 head in the group. Once it develops self-sufficiency (no dependency on other group), other groups can be removed.</a:t>
+            </a:r>
+          </a:p>
+        </p:txBody>
+      </p:sp>
+    </p:spTree>
+    <p:extLst>
+      <p:ext uri="{BB962C8B-B14F-4D97-AF65-F5344CB8AC3E}">
+        <p14:creationId xmlns:p14="http://schemas.microsoft.com/office/powerpoint/2010/main" val="155105084"/>
       </p:ext>
     </p:extLst>
   </p:cSld>

</xml_diff>

<commit_message>
made conceptualize self attention work; big O estimates
</commit_message>
<xml_diff>
--- a/notes/2024 12 25 experiment 2.pptx
+++ b/notes/2024 12 25 experiment 2.pptx
@@ -5,7 +5,7 @@
     <p:sldMasterId id="2147483648" r:id="rId1"/>
   </p:sldMasterIdLst>
   <p:notesMasterIdLst>
-    <p:notesMasterId r:id="rId9"/>
+    <p:notesMasterId r:id="rId12"/>
   </p:notesMasterIdLst>
   <p:sldIdLst>
     <p:sldId id="257" r:id="rId2"/>
@@ -13,8 +13,11 @@
     <p:sldId id="259" r:id="rId4"/>
     <p:sldId id="258" r:id="rId5"/>
     <p:sldId id="260" r:id="rId6"/>
-    <p:sldId id="261" r:id="rId7"/>
-    <p:sldId id="262" r:id="rId8"/>
+    <p:sldId id="264" r:id="rId7"/>
+    <p:sldId id="261" r:id="rId8"/>
+    <p:sldId id="262" r:id="rId9"/>
+    <p:sldId id="263" r:id="rId10"/>
+    <p:sldId id="265" r:id="rId11"/>
   </p:sldIdLst>
   <p:sldSz cx="12192000" cy="6858000"/>
   <p:notesSz cx="6858000" cy="9144000"/>
@@ -722,7 +725,7 @@
           <a:p>
             <a:fld id="{3098084A-C0FE-9240-A03A-0B24AAF4C80D}" type="slidenum">
               <a:rPr lang="en-US" smtClean="0"/>
-              <a:t>7</a:t>
+              <a:t>8</a:t>
             </a:fld>
             <a:endParaRPr lang="en-US"/>
           </a:p>
@@ -4089,6 +4092,92 @@
 </p:sld>
 </file>
 
+<file path=ppt/slides/slide10.xml><?xml version="1.0" encoding="utf-8"?>
+<p:sld xmlns:a="http://schemas.openxmlformats.org/drawingml/2006/main" xmlns:r="http://schemas.openxmlformats.org/officeDocument/2006/relationships" xmlns:p="http://schemas.openxmlformats.org/presentationml/2006/main">
+  <p:cSld>
+    <p:spTree>
+      <p:nvGrpSpPr>
+        <p:cNvPr id="1" name=""/>
+        <p:cNvGrpSpPr/>
+        <p:nvPr/>
+      </p:nvGrpSpPr>
+      <p:grpSpPr>
+        <a:xfrm>
+          <a:off x="0" y="0"/>
+          <a:ext cx="0" cy="0"/>
+          <a:chOff x="0" y="0"/>
+          <a:chExt cx="0" cy="0"/>
+        </a:xfrm>
+      </p:grpSpPr>
+      <p:sp>
+        <p:nvSpPr>
+          <p:cNvPr id="2" name="Title 1">
+            <a:extLst>
+              <a:ext uri="{FF2B5EF4-FFF2-40B4-BE49-F238E27FC236}">
+                <a16:creationId xmlns:a16="http://schemas.microsoft.com/office/drawing/2014/main" id="{8F2BE2D4-C6F4-808B-ECF3-C4421A2A9F13}"/>
+              </a:ext>
+            </a:extLst>
+          </p:cNvPr>
+          <p:cNvSpPr>
+            <a:spLocks noGrp="1"/>
+          </p:cNvSpPr>
+          <p:nvPr>
+            <p:ph type="title"/>
+          </p:nvPr>
+        </p:nvSpPr>
+        <p:spPr/>
+        <p:txBody>
+          <a:bodyPr/>
+          <a:lstStyle/>
+          <a:p>
+            <a:r>
+              <a:rPr lang="en-US" dirty="0"/>
+              <a:t>Double check</a:t>
+            </a:r>
+          </a:p>
+        </p:txBody>
+      </p:sp>
+      <p:sp>
+        <p:nvSpPr>
+          <p:cNvPr id="3" name="Content Placeholder 2">
+            <a:extLst>
+              <a:ext uri="{FF2B5EF4-FFF2-40B4-BE49-F238E27FC236}">
+                <a16:creationId xmlns:a16="http://schemas.microsoft.com/office/drawing/2014/main" id="{DC498E77-BA64-D92F-D66D-27B41A7602B5}"/>
+              </a:ext>
+            </a:extLst>
+          </p:cNvPr>
+          <p:cNvSpPr>
+            <a:spLocks noGrp="1"/>
+          </p:cNvSpPr>
+          <p:nvPr>
+            <p:ph idx="1"/>
+          </p:nvPr>
+        </p:nvSpPr>
+        <p:spPr/>
+        <p:txBody>
+          <a:bodyPr/>
+          <a:lstStyle/>
+          <a:p>
+            <a:r>
+              <a:rPr lang="en-US" dirty="0"/>
+              <a:t>How certain are we that this is not a convolution mechanism?</a:t>
+            </a:r>
+          </a:p>
+        </p:txBody>
+      </p:sp>
+    </p:spTree>
+    <p:extLst>
+      <p:ext uri="{BB962C8B-B14F-4D97-AF65-F5344CB8AC3E}">
+        <p14:creationId xmlns:p14="http://schemas.microsoft.com/office/powerpoint/2010/main" val="68458929"/>
+      </p:ext>
+    </p:extLst>
+  </p:cSld>
+  <p:clrMapOvr>
+    <a:masterClrMapping/>
+  </p:clrMapOvr>
+</p:sld>
+</file>
+
 <file path=ppt/slides/slide2.xml><?xml version="1.0" encoding="utf-8"?>
 <p:sld xmlns:a="http://schemas.openxmlformats.org/drawingml/2006/main" xmlns:r="http://schemas.openxmlformats.org/officeDocument/2006/relationships" xmlns:p="http://schemas.openxmlformats.org/presentationml/2006/main">
   <p:cSld>
@@ -16779,15 +16868,7 @@
             </a:br>
             <a:r>
               <a:rPr lang="en-US" dirty="0"/>
-              <a:t>Temperature-annealed </a:t>
-            </a:r>
-            <a:r>
-              <a:rPr lang="en-US" dirty="0" err="1"/>
-              <a:t>softmax</a:t>
-            </a:r>
-            <a:r>
-              <a:rPr lang="en-US" dirty="0"/>
-              <a:t> in attention mechanism of Transformers</a:t>
+              <a:t>Temperature-annealed softmax in attention mechanism of Transformers</a:t>
             </a:r>
           </a:p>
         </p:txBody>
@@ -16875,7 +16956,7 @@
           <p:cNvPr id="2" name="Title 1">
             <a:extLst>
               <a:ext uri="{FF2B5EF4-FFF2-40B4-BE49-F238E27FC236}">
-                <a16:creationId xmlns:a16="http://schemas.microsoft.com/office/drawing/2014/main" id="{033B4EEC-9120-98A4-6323-8DA1DAA4A79E}"/>
+                <a16:creationId xmlns:a16="http://schemas.microsoft.com/office/drawing/2014/main" id="{3E316CE9-B73B-0317-BAB4-8478B5BA0C14}"/>
               </a:ext>
             </a:extLst>
           </p:cNvPr>
@@ -16893,47 +16974,14 @@
           <a:p>
             <a:r>
               <a:rPr lang="en-US" dirty="0"/>
-              <a:t>“Conceptualized attention” - exploration</a:t>
+              <a:t>Experiment 2c:</a:t>
             </a:r>
-          </a:p>
-        </p:txBody>
-      </p:sp>
-      <p:sp>
-        <p:nvSpPr>
-          <p:cNvPr id="3" name="Content Placeholder 2">
-            <a:extLst>
-              <a:ext uri="{FF2B5EF4-FFF2-40B4-BE49-F238E27FC236}">
-                <a16:creationId xmlns:a16="http://schemas.microsoft.com/office/drawing/2014/main" id="{615E7338-96FE-BE92-E9D9-DDDA958A44CA}"/>
-              </a:ext>
-            </a:extLst>
-          </p:cNvPr>
-          <p:cNvSpPr>
-            <a:spLocks noGrp="1"/>
-          </p:cNvSpPr>
-          <p:nvPr>
-            <p:ph idx="1"/>
-          </p:nvPr>
-        </p:nvSpPr>
-        <p:spPr/>
-        <p:txBody>
-          <a:bodyPr/>
-          <a:lstStyle/>
-          <a:p>
+            <a:br>
+              <a:rPr lang="en-US" dirty="0"/>
+            </a:br>
             <a:r>
               <a:rPr lang="en-US" dirty="0"/>
-              <a:t>An attention built by seemingly same principles, just somewhat different pattern</a:t>
-            </a:r>
-          </a:p>
-          <a:p>
-            <a:r>
-              <a:rPr lang="en-US" dirty="0"/>
-              <a:t>Doesn’t converge (doesn’t even begin to converge)</a:t>
-            </a:r>
-          </a:p>
-          <a:p>
-            <a:r>
-              <a:rPr lang="en-US" dirty="0"/>
-              <a:t>Why?</a:t>
+              <a:t>“Conceptualized Attention” - exploration</a:t>
             </a:r>
           </a:p>
         </p:txBody>
@@ -16941,7 +16989,7 @@
     </p:spTree>
     <p:extLst>
       <p:ext uri="{BB962C8B-B14F-4D97-AF65-F5344CB8AC3E}">
-        <p14:creationId xmlns:p14="http://schemas.microsoft.com/office/powerpoint/2010/main" val="2908065297"/>
+        <p14:creationId xmlns:p14="http://schemas.microsoft.com/office/powerpoint/2010/main" val="3692323239"/>
       </p:ext>
     </p:extLst>
   </p:cSld>
@@ -16968,6 +17016,139 @@
           <a:chExt cx="0" cy="0"/>
         </a:xfrm>
       </p:grpSpPr>
+      <p:sp>
+        <p:nvSpPr>
+          <p:cNvPr id="2" name="Title 1">
+            <a:extLst>
+              <a:ext uri="{FF2B5EF4-FFF2-40B4-BE49-F238E27FC236}">
+                <a16:creationId xmlns:a16="http://schemas.microsoft.com/office/drawing/2014/main" id="{033B4EEC-9120-98A4-6323-8DA1DAA4A79E}"/>
+              </a:ext>
+            </a:extLst>
+          </p:cNvPr>
+          <p:cNvSpPr>
+            <a:spLocks noGrp="1"/>
+          </p:cNvSpPr>
+          <p:nvPr>
+            <p:ph type="title"/>
+          </p:nvPr>
+        </p:nvSpPr>
+        <p:spPr/>
+        <p:txBody>
+          <a:bodyPr/>
+          <a:lstStyle/>
+          <a:p>
+            <a:r>
+              <a:rPr lang="en-US" dirty="0"/>
+              <a:t>“Conceptualized Attention”</a:t>
+            </a:r>
+          </a:p>
+        </p:txBody>
+      </p:sp>
+      <p:sp>
+        <p:nvSpPr>
+          <p:cNvPr id="3" name="Content Placeholder 2">
+            <a:extLst>
+              <a:ext uri="{FF2B5EF4-FFF2-40B4-BE49-F238E27FC236}">
+                <a16:creationId xmlns:a16="http://schemas.microsoft.com/office/drawing/2014/main" id="{615E7338-96FE-BE92-E9D9-DDDA958A44CA}"/>
+              </a:ext>
+            </a:extLst>
+          </p:cNvPr>
+          <p:cNvSpPr>
+            <a:spLocks noGrp="1"/>
+          </p:cNvSpPr>
+          <p:nvPr>
+            <p:ph idx="1"/>
+          </p:nvPr>
+        </p:nvSpPr>
+        <p:spPr/>
+        <p:txBody>
+          <a:bodyPr/>
+          <a:lstStyle/>
+          <a:p>
+            <a:r>
+              <a:rPr lang="en-US" dirty="0"/>
+              <a:t>An attention built by seemingly same principles, just completely different wiring pattern</a:t>
+            </a:r>
+          </a:p>
+          <a:p>
+            <a:pPr lvl="1"/>
+            <a:r>
+              <a:rPr lang="en-US" dirty="0"/>
+              <a:t>something in between LSTM/GRU and Self-Attention</a:t>
+            </a:r>
+          </a:p>
+          <a:p>
+            <a:pPr lvl="2"/>
+            <a:r>
+              <a:rPr lang="en-US" dirty="0"/>
+              <a:t>(no forget gates of LSTM, no recurrence)</a:t>
+            </a:r>
+          </a:p>
+          <a:p>
+            <a:pPr lvl="1"/>
+            <a:r>
+              <a:rPr lang="en-US" dirty="0"/>
+              <a:t>aiming to kill s-squared of context size</a:t>
+            </a:r>
+          </a:p>
+          <a:p>
+            <a:r>
+              <a:rPr lang="en-US" dirty="0"/>
+              <a:t>Initially, just to test intuitions</a:t>
+            </a:r>
+          </a:p>
+          <a:p>
+            <a:r>
+              <a:rPr lang="en-US" dirty="0"/>
+              <a:t>Does converge!</a:t>
+            </a:r>
+          </a:p>
+          <a:p>
+            <a:r>
+              <a:rPr lang="en-US" dirty="0"/>
+              <a:t>Completely different </a:t>
+            </a:r>
+            <a:r>
+              <a:rPr lang="en-US" dirty="0" err="1"/>
+              <a:t>arithmetics</a:t>
+            </a:r>
+            <a:r>
+              <a:rPr lang="en-US" dirty="0"/>
+              <a:t> of big-O of parameters</a:t>
+            </a:r>
+          </a:p>
+        </p:txBody>
+      </p:sp>
+    </p:spTree>
+    <p:extLst>
+      <p:ext uri="{BB962C8B-B14F-4D97-AF65-F5344CB8AC3E}">
+        <p14:creationId xmlns:p14="http://schemas.microsoft.com/office/powerpoint/2010/main" val="2908065297"/>
+      </p:ext>
+    </p:extLst>
+  </p:cSld>
+  <p:clrMapOvr>
+    <a:masterClrMapping/>
+  </p:clrMapOvr>
+</p:sld>
+</file>
+
+<file path=ppt/slides/slide8.xml><?xml version="1.0" encoding="utf-8"?>
+<p:sld xmlns:a="http://schemas.openxmlformats.org/drawingml/2006/main" xmlns:r="http://schemas.openxmlformats.org/officeDocument/2006/relationships" xmlns:p="http://schemas.openxmlformats.org/presentationml/2006/main">
+  <p:cSld>
+    <p:spTree>
+      <p:nvGrpSpPr>
+        <p:cNvPr id="1" name=""/>
+        <p:cNvGrpSpPr/>
+        <p:nvPr/>
+      </p:nvGrpSpPr>
+      <p:grpSpPr>
+        <a:xfrm>
+          <a:off x="0" y="0"/>
+          <a:ext cx="0" cy="0"/>
+          <a:chOff x="0" y="0"/>
+          <a:chExt cx="0" cy="0"/>
+        </a:xfrm>
+      </p:grpSpPr>
       <p:grpSp>
         <p:nvGrpSpPr>
           <p:cNvPr id="5" name="Group 4">
@@ -16982,7 +17163,7 @@
         </p:nvGrpSpPr>
         <p:grpSpPr>
           <a:xfrm rot="4482237">
-            <a:off x="862038" y="5610617"/>
+            <a:off x="1090235" y="5590526"/>
             <a:ext cx="80433" cy="524933"/>
             <a:chOff x="876300" y="3429000"/>
             <a:chExt cx="279400" cy="1981200"/>
@@ -17939,7 +18120,7 @@
         </p:nvSpPr>
         <p:spPr>
           <a:xfrm>
-            <a:off x="464028" y="6341950"/>
+            <a:off x="937610" y="6360313"/>
             <a:ext cx="340158" cy="276999"/>
           </a:xfrm>
           <a:prstGeom prst="rect">
@@ -18030,49 +18211,6 @@
           </a:p>
         </p:txBody>
       </p:sp>
-      <p:cxnSp>
-        <p:nvCxnSpPr>
-          <p:cNvPr id="44" name="Curved Connector 43">
-            <a:extLst>
-              <a:ext uri="{FF2B5EF4-FFF2-40B4-BE49-F238E27FC236}">
-                <a16:creationId xmlns:a16="http://schemas.microsoft.com/office/drawing/2014/main" id="{278E1E7F-CFDB-2CB9-631C-C0A5CEF47887}"/>
-              </a:ext>
-            </a:extLst>
-          </p:cNvPr>
-          <p:cNvCxnSpPr>
-            <a:cxnSpLocks/>
-          </p:cNvCxnSpPr>
-          <p:nvPr/>
-        </p:nvCxnSpPr>
-        <p:spPr>
-          <a:xfrm rot="5400000" flipH="1" flipV="1">
-            <a:off x="480408" y="4160148"/>
-            <a:ext cx="1813507" cy="1516713"/>
-          </a:xfrm>
-          <a:prstGeom prst="curvedConnector3">
-            <a:avLst>
-              <a:gd name="adj1" fmla="val 50000"/>
-            </a:avLst>
-          </a:prstGeom>
-          <a:ln>
-            <a:tailEnd type="triangle"/>
-          </a:ln>
-        </p:spPr>
-        <p:style>
-          <a:lnRef idx="2">
-            <a:schemeClr val="accent1"/>
-          </a:lnRef>
-          <a:fillRef idx="0">
-            <a:schemeClr val="accent1"/>
-          </a:fillRef>
-          <a:effectRef idx="1">
-            <a:schemeClr val="accent1"/>
-          </a:effectRef>
-          <a:fontRef idx="minor">
-            <a:schemeClr val="tx1"/>
-          </a:fontRef>
-        </p:style>
-      </p:cxnSp>
       <p:sp>
         <p:nvSpPr>
           <p:cNvPr id="47" name="TextBox 46">
@@ -18147,49 +18285,6 @@
           </a:p>
         </p:txBody>
       </p:sp>
-      <p:cxnSp>
-        <p:nvCxnSpPr>
-          <p:cNvPr id="56" name="Curved Connector 55">
-            <a:extLst>
-              <a:ext uri="{FF2B5EF4-FFF2-40B4-BE49-F238E27FC236}">
-                <a16:creationId xmlns:a16="http://schemas.microsoft.com/office/drawing/2014/main" id="{7E39302D-4C04-E666-3961-50A2AA231D50}"/>
-              </a:ext>
-            </a:extLst>
-          </p:cNvPr>
-          <p:cNvCxnSpPr>
-            <a:cxnSpLocks/>
-          </p:cNvCxnSpPr>
-          <p:nvPr/>
-        </p:nvCxnSpPr>
-        <p:spPr>
-          <a:xfrm rot="5400000" flipH="1" flipV="1">
-            <a:off x="341469" y="4287693"/>
-            <a:ext cx="2380216" cy="623318"/>
-          </a:xfrm>
-          <a:prstGeom prst="curvedConnector3">
-            <a:avLst>
-              <a:gd name="adj1" fmla="val 20065"/>
-            </a:avLst>
-          </a:prstGeom>
-          <a:ln>
-            <a:tailEnd type="triangle"/>
-          </a:ln>
-        </p:spPr>
-        <p:style>
-          <a:lnRef idx="2">
-            <a:schemeClr val="accent1"/>
-          </a:lnRef>
-          <a:fillRef idx="0">
-            <a:schemeClr val="accent1"/>
-          </a:fillRef>
-          <a:effectRef idx="1">
-            <a:schemeClr val="accent1"/>
-          </a:effectRef>
-          <a:fontRef idx="minor">
-            <a:schemeClr val="tx1"/>
-          </a:fontRef>
-        </p:style>
-      </p:cxnSp>
       <p:sp>
         <p:nvSpPr>
           <p:cNvPr id="57" name="TextBox 56">
@@ -18278,48 +18373,50 @@
           </a:p>
         </p:txBody>
       </p:sp>
-      <p:cxnSp>
-        <p:nvCxnSpPr>
-          <p:cNvPr id="64" name="Curved Connector 63">
-            <a:extLst>
-              <a:ext uri="{FF2B5EF4-FFF2-40B4-BE49-F238E27FC236}">
-                <a16:creationId xmlns:a16="http://schemas.microsoft.com/office/drawing/2014/main" id="{FCA17184-40A9-4874-B309-591B9D92B5F4}"/>
-              </a:ext>
-            </a:extLst>
-          </p:cNvPr>
-          <p:cNvCxnSpPr>
-            <a:cxnSpLocks/>
-            <a:stCxn id="61" idx="2"/>
-          </p:cNvCxnSpPr>
+      <p:sp>
+        <p:nvSpPr>
+          <p:cNvPr id="65" name="TextBox 64">
+            <a:extLst>
+              <a:ext uri="{FF2B5EF4-FFF2-40B4-BE49-F238E27FC236}">
+                <a16:creationId xmlns:a16="http://schemas.microsoft.com/office/drawing/2014/main" id="{8F6DD3C6-4089-A22E-0346-CE3A9D65DFC4}"/>
+              </a:ext>
+            </a:extLst>
+          </p:cNvPr>
+          <p:cNvSpPr txBox="1"/>
           <p:nvPr/>
-        </p:nvCxnSpPr>
+        </p:nvSpPr>
         <p:spPr>
-          <a:xfrm rot="16200000" flipV="1">
-            <a:off x="1983470" y="3603140"/>
-            <a:ext cx="154024" cy="434492"/>
-          </a:xfrm>
-          <a:prstGeom prst="curvedConnector2">
+          <a:xfrm>
+            <a:off x="364415" y="3720371"/>
+            <a:ext cx="1522799" cy="430887"/>
+          </a:xfrm>
+          <a:prstGeom prst="rect">
             <a:avLst/>
           </a:prstGeom>
-          <a:ln w="6350">
-            <a:tailEnd type="diamond"/>
-          </a:ln>
+          <a:solidFill>
+            <a:schemeClr val="bg1"/>
+          </a:solidFill>
         </p:spPr>
-        <p:style>
-          <a:lnRef idx="2">
-            <a:schemeClr val="accent1"/>
-          </a:lnRef>
-          <a:fillRef idx="0">
-            <a:schemeClr val="accent1"/>
-          </a:fillRef>
-          <a:effectRef idx="1">
-            <a:schemeClr val="accent1"/>
-          </a:effectRef>
-          <a:fontRef idx="minor">
-            <a:schemeClr val="tx1"/>
-          </a:fontRef>
-        </p:style>
-      </p:cxnSp>
+        <p:txBody>
+          <a:bodyPr wrap="square" rtlCol="0">
+            <a:spAutoFit/>
+          </a:bodyPr>
+          <a:lstStyle/>
+          <a:p>
+            <a:r>
+              <a:rPr lang="en-US" sz="1200" dirty="0"/>
+              <a:t>L1 “concepts”</a:t>
+            </a:r>
+            <a:br>
+              <a:rPr lang="en-US" sz="1200" dirty="0"/>
+            </a:br>
+            <a:r>
+              <a:rPr lang="en-US" sz="1000" dirty="0"/>
+              <a:t>(fc + sigmoid + softmax)</a:t>
+            </a:r>
+          </a:p>
+        </p:txBody>
+      </p:sp>
       <p:sp>
         <p:nvSpPr>
           <p:cNvPr id="92" name="Cube 91">
@@ -18366,50 +18463,6 @@
           <a:p>
             <a:pPr algn="ctr"/>
             <a:endParaRPr lang="en-US"/>
-          </a:p>
-        </p:txBody>
-      </p:sp>
-      <p:sp>
-        <p:nvSpPr>
-          <p:cNvPr id="65" name="TextBox 64">
-            <a:extLst>
-              <a:ext uri="{FF2B5EF4-FFF2-40B4-BE49-F238E27FC236}">
-                <a16:creationId xmlns:a16="http://schemas.microsoft.com/office/drawing/2014/main" id="{8F6DD3C6-4089-A22E-0346-CE3A9D65DFC4}"/>
-              </a:ext>
-            </a:extLst>
-          </p:cNvPr>
-          <p:cNvSpPr txBox="1"/>
-          <p:nvPr/>
-        </p:nvSpPr>
-        <p:spPr>
-          <a:xfrm>
-            <a:off x="494156" y="3720862"/>
-            <a:ext cx="1123193" cy="461665"/>
-          </a:xfrm>
-          <a:prstGeom prst="rect">
-            <a:avLst/>
-          </a:prstGeom>
-          <a:solidFill>
-            <a:schemeClr val="bg1"/>
-          </a:solidFill>
-        </p:spPr>
-        <p:txBody>
-          <a:bodyPr wrap="none" rtlCol="0">
-            <a:spAutoFit/>
-          </a:bodyPr>
-          <a:lstStyle/>
-          <a:p>
-            <a:r>
-              <a:rPr lang="en-US" sz="1200" dirty="0"/>
-              <a:t>L1 “concepts”</a:t>
-            </a:r>
-            <a:br>
-              <a:rPr lang="en-US" sz="1200" dirty="0"/>
-            </a:br>
-            <a:r>
-              <a:rPr lang="en-US" sz="1200" dirty="0"/>
-              <a:t>(fc + sigmoid)</a:t>
-            </a:r>
           </a:p>
         </p:txBody>
       </p:sp>
@@ -18828,96 +18881,6 @@
           </a:p>
         </p:txBody>
       </p:sp>
-      <p:sp>
-        <p:nvSpPr>
-          <p:cNvPr id="137" name="TextBox 136">
-            <a:extLst>
-              <a:ext uri="{FF2B5EF4-FFF2-40B4-BE49-F238E27FC236}">
-                <a16:creationId xmlns:a16="http://schemas.microsoft.com/office/drawing/2014/main" id="{EDBB4FAF-A8CB-ED1B-E0D2-9DBD3424C322}"/>
-              </a:ext>
-            </a:extLst>
-          </p:cNvPr>
-          <p:cNvSpPr txBox="1"/>
-          <p:nvPr/>
-        </p:nvSpPr>
-        <p:spPr>
-          <a:xfrm>
-            <a:off x="8762758" y="1110947"/>
-            <a:ext cx="3231493" cy="2246769"/>
-          </a:xfrm>
-          <a:prstGeom prst="rect">
-            <a:avLst/>
-          </a:prstGeom>
-          <a:noFill/>
-        </p:spPr>
-        <p:txBody>
-          <a:bodyPr wrap="square" rtlCol="0">
-            <a:spAutoFit/>
-          </a:bodyPr>
-          <a:lstStyle/>
-          <a:p>
-            <a:r>
-              <a:rPr lang="en-US" sz="1400" dirty="0"/>
-              <a:t>Possible learned, and actually observed, dependency paths:</a:t>
-            </a:r>
-          </a:p>
-          <a:p>
-            <a:pPr marL="342900" indent="-342900">
-              <a:buAutoNum type="arabicPeriod"/>
-            </a:pPr>
-            <a:r>
-              <a:rPr lang="en-US" sz="1400" dirty="0"/>
-              <a:t>EOU • T2, where T2 is T1-aware</a:t>
-            </a:r>
-          </a:p>
-          <a:p>
-            <a:pPr marL="342900" indent="-342900">
-              <a:buFontTx/>
-              <a:buAutoNum type="arabicPeriod"/>
-            </a:pPr>
-            <a:r>
-              <a:rPr lang="en-US" sz="1400" dirty="0"/>
-              <a:t>EOU • T1, where T1 is T2-aware</a:t>
-            </a:r>
-          </a:p>
-          <a:p>
-            <a:pPr marL="342900" indent="-342900">
-              <a:buFontTx/>
-              <a:buAutoNum type="arabicPeriod"/>
-            </a:pPr>
-            <a:r>
-              <a:rPr lang="en-US" sz="1400" dirty="0"/>
-              <a:t>EOU • T1 • T2</a:t>
-            </a:r>
-          </a:p>
-          <a:p>
-            <a:pPr marL="800100" lvl="1" indent="-342900">
-              <a:buFont typeface="Arial" panose="020B0604020202020204" pitchFamily="34" charset="0"/>
-              <a:buChar char="•"/>
-            </a:pPr>
-            <a:r>
-              <a:rPr lang="en-US" sz="1400" dirty="0"/>
-              <a:t>split attention</a:t>
-            </a:r>
-          </a:p>
-          <a:p>
-            <a:pPr marL="800100" lvl="1" indent="-342900">
-              <a:buFont typeface="Arial" panose="020B0604020202020204" pitchFamily="34" charset="0"/>
-              <a:buChar char="•"/>
-            </a:pPr>
-            <a:r>
-              <a:rPr lang="en-US" sz="1400" dirty="0"/>
-              <a:t>note: consider variations of T1/T2 awareness or not awareness in this case</a:t>
-            </a:r>
-          </a:p>
-          <a:p>
-            <a:pPr marL="342900" indent="-342900">
-              <a:buAutoNum type="arabicPeriod"/>
-            </a:pPr>
-            <a:endParaRPr lang="en-US" sz="1400" dirty="0"/>
-          </a:p>
-        </p:txBody>
-      </p:sp>
       <p:cxnSp>
         <p:nvCxnSpPr>
           <p:cNvPr id="142" name="Curved Connector 141">
@@ -18934,8 +18897,8 @@
         </p:nvCxnSpPr>
         <p:spPr>
           <a:xfrm rot="5400000" flipH="1" flipV="1">
-            <a:off x="607529" y="4116554"/>
-            <a:ext cx="1783619" cy="1565678"/>
+            <a:off x="842883" y="4285002"/>
+            <a:ext cx="1716710" cy="1161875"/>
           </a:xfrm>
           <a:prstGeom prst="curvedConnector3">
             <a:avLst>
@@ -19323,8 +19286,8 @@
         </p:nvCxnSpPr>
         <p:spPr>
           <a:xfrm rot="5400000" flipH="1" flipV="1">
-            <a:off x="707253" y="4098900"/>
-            <a:ext cx="1771156" cy="1620278"/>
+            <a:off x="913776" y="4227822"/>
+            <a:ext cx="1693555" cy="1284834"/>
           </a:xfrm>
           <a:prstGeom prst="curvedConnector3">
             <a:avLst>
@@ -19366,8 +19329,8 @@
         </p:nvCxnSpPr>
         <p:spPr>
           <a:xfrm rot="5400000" flipH="1" flipV="1">
-            <a:off x="812651" y="4052627"/>
-            <a:ext cx="1754123" cy="1678114"/>
+            <a:off x="978414" y="4166662"/>
+            <a:ext cx="1702393" cy="1398317"/>
           </a:xfrm>
           <a:prstGeom prst="curvedConnector3">
             <a:avLst>
@@ -19409,8 +19372,8 @@
         </p:nvCxnSpPr>
         <p:spPr>
           <a:xfrm rot="5400000" flipH="1" flipV="1">
-            <a:off x="955929" y="4040191"/>
-            <a:ext cx="1721432" cy="1692562"/>
+            <a:off x="1046888" y="4091909"/>
+            <a:ext cx="1682187" cy="1549889"/>
           </a:xfrm>
           <a:prstGeom prst="curvedConnector3">
             <a:avLst>
@@ -19457,7 +19420,7 @@
           </a:xfrm>
           <a:prstGeom prst="curvedConnector3">
             <a:avLst>
-              <a:gd name="adj1" fmla="val 50000"/>
+              <a:gd name="adj1" fmla="val 43937"/>
             </a:avLst>
           </a:prstGeom>
           <a:ln>
@@ -19495,8 +19458,8 @@
         </p:nvCxnSpPr>
         <p:spPr>
           <a:xfrm rot="16200000" flipV="1">
-            <a:off x="1906701" y="5241434"/>
-            <a:ext cx="919912" cy="233791"/>
+            <a:off x="1936475" y="5211660"/>
+            <a:ext cx="982588" cy="356013"/>
           </a:xfrm>
           <a:prstGeom prst="curvedConnector3">
             <a:avLst>
@@ -19538,8 +19501,8 @@
         </p:nvCxnSpPr>
         <p:spPr>
           <a:xfrm rot="16200000" flipV="1">
-            <a:off x="1964233" y="5271907"/>
-            <a:ext cx="919912" cy="233791"/>
+            <a:off x="1990773" y="5245367"/>
+            <a:ext cx="935108" cy="302065"/>
           </a:xfrm>
           <a:prstGeom prst="curvedConnector3">
             <a:avLst>
@@ -19624,8 +19587,8 @@
         </p:nvCxnSpPr>
         <p:spPr>
           <a:xfrm rot="16200000" flipV="1">
-            <a:off x="2101159" y="5343874"/>
-            <a:ext cx="919912" cy="233791"/>
+            <a:off x="2089081" y="5355953"/>
+            <a:ext cx="856553" cy="146273"/>
           </a:xfrm>
           <a:prstGeom prst="curvedConnector3">
             <a:avLst>
@@ -19667,8 +19630,8 @@
         </p:nvCxnSpPr>
         <p:spPr>
           <a:xfrm rot="16200000" flipV="1">
-            <a:off x="2171720" y="5370342"/>
-            <a:ext cx="919912" cy="233791"/>
+            <a:off x="2166194" y="5375869"/>
+            <a:ext cx="795503" cy="98328"/>
           </a:xfrm>
           <a:prstGeom prst="curvedConnector3">
             <a:avLst>
@@ -19710,8 +19673,8 @@
         </p:nvCxnSpPr>
         <p:spPr>
           <a:xfrm rot="16200000" flipV="1">
-            <a:off x="2243279" y="5404264"/>
-            <a:ext cx="919912" cy="233791"/>
+            <a:off x="2197720" y="5449824"/>
+            <a:ext cx="802751" cy="25510"/>
           </a:xfrm>
           <a:prstGeom prst="curvedConnector3">
             <a:avLst>
@@ -19802,8 +19765,8 @@
         </p:nvCxnSpPr>
         <p:spPr>
           <a:xfrm rot="16200000" flipV="1">
-            <a:off x="2894169" y="4334938"/>
-            <a:ext cx="1391265" cy="1354751"/>
+            <a:off x="2906532" y="4322576"/>
+            <a:ext cx="1506104" cy="1494314"/>
           </a:xfrm>
           <a:prstGeom prst="curvedConnector3">
             <a:avLst>
@@ -19845,8 +19808,8 @@
         </p:nvCxnSpPr>
         <p:spPr>
           <a:xfrm rot="16200000" flipV="1">
-            <a:off x="2983556" y="4338900"/>
-            <a:ext cx="1391265" cy="1354751"/>
+            <a:off x="2988212" y="4334246"/>
+            <a:ext cx="1451273" cy="1424068"/>
           </a:xfrm>
           <a:prstGeom prst="curvedConnector3">
             <a:avLst>
@@ -19888,8 +19851,8 @@
         </p:nvCxnSpPr>
         <p:spPr>
           <a:xfrm rot="16200000" flipV="1">
-            <a:off x="3074230" y="4344096"/>
-            <a:ext cx="1391265" cy="1354751"/>
+            <a:off x="3002688" y="4415640"/>
+            <a:ext cx="1493855" cy="1314253"/>
           </a:xfrm>
           <a:prstGeom prst="curvedConnector3">
             <a:avLst>
@@ -19931,8 +19894,8 @@
         </p:nvCxnSpPr>
         <p:spPr>
           <a:xfrm rot="16200000" flipV="1">
-            <a:off x="3163617" y="4344095"/>
-            <a:ext cx="1391265" cy="1354751"/>
+            <a:off x="3046486" y="4461228"/>
+            <a:ext cx="1488929" cy="1218147"/>
           </a:xfrm>
           <a:prstGeom prst="curvedConnector3">
             <a:avLst>
@@ -19974,8 +19937,8 @@
         </p:nvCxnSpPr>
         <p:spPr>
           <a:xfrm rot="16200000" flipV="1">
-            <a:off x="3252314" y="4351286"/>
-            <a:ext cx="1391265" cy="1354751"/>
+            <a:off x="3106463" y="4497141"/>
+            <a:ext cx="1474545" cy="1146323"/>
           </a:xfrm>
           <a:prstGeom prst="curvedConnector3">
             <a:avLst>
@@ -20017,8 +19980,8 @@
         </p:nvCxnSpPr>
         <p:spPr>
           <a:xfrm rot="16200000" flipV="1">
-            <a:off x="3338516" y="4356215"/>
-            <a:ext cx="1391265" cy="1354751"/>
+            <a:off x="3158086" y="4536646"/>
+            <a:ext cx="1457498" cy="1060121"/>
           </a:xfrm>
           <a:prstGeom prst="curvedConnector3">
             <a:avLst>
@@ -20179,48 +20142,6 @@
           </a:p>
         </p:txBody>
       </p:sp>
-      <p:cxnSp>
-        <p:nvCxnSpPr>
-          <p:cNvPr id="214" name="Curved Connector 213">
-            <a:extLst>
-              <a:ext uri="{FF2B5EF4-FFF2-40B4-BE49-F238E27FC236}">
-                <a16:creationId xmlns:a16="http://schemas.microsoft.com/office/drawing/2014/main" id="{FCE452CA-5AA3-D5F6-90A7-69C12CAFE0A7}"/>
-              </a:ext>
-            </a:extLst>
-          </p:cNvPr>
-          <p:cNvCxnSpPr>
-            <a:cxnSpLocks/>
-            <a:stCxn id="213" idx="2"/>
-          </p:cNvCxnSpPr>
-          <p:nvPr/>
-        </p:nvCxnSpPr>
-        <p:spPr>
-          <a:xfrm rot="16200000" flipV="1">
-            <a:off x="2071397" y="3428604"/>
-            <a:ext cx="250513" cy="706833"/>
-          </a:xfrm>
-          <a:prstGeom prst="curvedConnector2">
-            <a:avLst/>
-          </a:prstGeom>
-          <a:ln w="6350">
-            <a:tailEnd type="diamond"/>
-          </a:ln>
-        </p:spPr>
-        <p:style>
-          <a:lnRef idx="2">
-            <a:schemeClr val="accent1"/>
-          </a:lnRef>
-          <a:fillRef idx="0">
-            <a:schemeClr val="accent1"/>
-          </a:fillRef>
-          <a:effectRef idx="1">
-            <a:schemeClr val="accent1"/>
-          </a:effectRef>
-          <a:fontRef idx="minor">
-            <a:schemeClr val="tx1"/>
-          </a:fontRef>
-        </p:style>
-      </p:cxnSp>
       <p:sp>
         <p:nvSpPr>
           <p:cNvPr id="217" name="TextBox 216">
@@ -20235,7 +20156,7 @@
         </p:nvSpPr>
         <p:spPr>
           <a:xfrm>
-            <a:off x="4256185" y="3090908"/>
+            <a:off x="4338481" y="3090908"/>
             <a:ext cx="1691425" cy="646331"/>
           </a:xfrm>
           <a:prstGeom prst="rect">
@@ -20286,7 +20207,7 @@
         </p:nvGrpSpPr>
         <p:grpSpPr>
           <a:xfrm rot="5400000">
-            <a:off x="3929858" y="3006455"/>
+            <a:off x="4012154" y="3006455"/>
             <a:ext cx="80433" cy="524933"/>
             <a:chOff x="876300" y="3429000"/>
             <a:chExt cx="279400" cy="1981200"/>
@@ -20535,12 +20456,12 @@
         </p:nvCxnSpPr>
         <p:spPr>
           <a:xfrm rot="5400000" flipH="1" flipV="1">
-            <a:off x="2218497" y="4043016"/>
-            <a:ext cx="2553229" cy="1122658"/>
+            <a:off x="2267041" y="4075985"/>
+            <a:ext cx="2471716" cy="1138234"/>
           </a:xfrm>
           <a:prstGeom prst="curvedConnector3">
             <a:avLst>
-              <a:gd name="adj1" fmla="val 6848"/>
+              <a:gd name="adj1" fmla="val 6716"/>
             </a:avLst>
           </a:prstGeom>
           <a:ln>
@@ -20646,10 +20567,540 @@
           </a:fontRef>
         </p:style>
       </p:cxnSp>
+      <p:cxnSp>
+        <p:nvCxnSpPr>
+          <p:cNvPr id="44" name="Curved Connector 43">
+            <a:extLst>
+              <a:ext uri="{FF2B5EF4-FFF2-40B4-BE49-F238E27FC236}">
+                <a16:creationId xmlns:a16="http://schemas.microsoft.com/office/drawing/2014/main" id="{278E1E7F-CFDB-2CB9-631C-C0A5CEF47887}"/>
+              </a:ext>
+            </a:extLst>
+          </p:cNvPr>
+          <p:cNvCxnSpPr>
+            <a:cxnSpLocks/>
+          </p:cNvCxnSpPr>
+          <p:nvPr/>
+        </p:nvCxnSpPr>
+        <p:spPr>
+          <a:xfrm rot="5400000" flipH="1" flipV="1">
+            <a:off x="776662" y="4355441"/>
+            <a:ext cx="1712542" cy="1025165"/>
+          </a:xfrm>
+          <a:prstGeom prst="curvedConnector3">
+            <a:avLst>
+              <a:gd name="adj1" fmla="val 50000"/>
+            </a:avLst>
+          </a:prstGeom>
+          <a:ln>
+            <a:tailEnd type="triangle"/>
+          </a:ln>
+        </p:spPr>
+        <p:style>
+          <a:lnRef idx="2">
+            <a:schemeClr val="accent1"/>
+          </a:lnRef>
+          <a:fillRef idx="0">
+            <a:schemeClr val="accent1"/>
+          </a:fillRef>
+          <a:effectRef idx="1">
+            <a:schemeClr val="accent1"/>
+          </a:effectRef>
+          <a:fontRef idx="minor">
+            <a:schemeClr val="tx1"/>
+          </a:fontRef>
+        </p:style>
+      </p:cxnSp>
+      <p:sp>
+        <p:nvSpPr>
+          <p:cNvPr id="245" name="Rounded Rectangle 244">
+            <a:extLst>
+              <a:ext uri="{FF2B5EF4-FFF2-40B4-BE49-F238E27FC236}">
+                <a16:creationId xmlns:a16="http://schemas.microsoft.com/office/drawing/2014/main" id="{67412F1B-1270-A6DF-1390-C6C791128A68}"/>
+              </a:ext>
+            </a:extLst>
+          </p:cNvPr>
+          <p:cNvSpPr/>
+          <p:nvPr/>
+        </p:nvSpPr>
+        <p:spPr>
+          <a:xfrm>
+            <a:off x="2952819" y="4092917"/>
+            <a:ext cx="310896" cy="224881"/>
+          </a:xfrm>
+          <a:prstGeom prst="roundRect">
+            <a:avLst/>
+          </a:prstGeom>
+          <a:solidFill>
+            <a:schemeClr val="tx2">
+              <a:lumMod val="10000"/>
+              <a:lumOff val="90000"/>
+            </a:schemeClr>
+          </a:solidFill>
+          <a:ln>
+            <a:noFill/>
+          </a:ln>
+        </p:spPr>
+        <p:style>
+          <a:lnRef idx="2">
+            <a:schemeClr val="accent1">
+              <a:shade val="15000"/>
+            </a:schemeClr>
+          </a:lnRef>
+          <a:fillRef idx="1">
+            <a:schemeClr val="accent1"/>
+          </a:fillRef>
+          <a:effectRef idx="0">
+            <a:schemeClr val="accent1"/>
+          </a:effectRef>
+          <a:fontRef idx="minor">
+            <a:schemeClr val="lt1"/>
+          </a:fontRef>
+        </p:style>
+        <p:txBody>
+          <a:bodyPr rtlCol="0" anchor="ctr"/>
+          <a:lstStyle/>
+          <a:p>
+            <a:pPr algn="ctr"/>
+            <a:r>
+              <a:rPr lang="en-US" dirty="0"/>
+              <a:t>+</a:t>
+            </a:r>
+          </a:p>
+        </p:txBody>
+      </p:sp>
+      <p:sp>
+        <p:nvSpPr>
+          <p:cNvPr id="246" name="Rounded Rectangle 245">
+            <a:extLst>
+              <a:ext uri="{FF2B5EF4-FFF2-40B4-BE49-F238E27FC236}">
+                <a16:creationId xmlns:a16="http://schemas.microsoft.com/office/drawing/2014/main" id="{AD6BD08F-55DA-738A-01AD-80F0BD677EB3}"/>
+              </a:ext>
+            </a:extLst>
+          </p:cNvPr>
+          <p:cNvSpPr/>
+          <p:nvPr/>
+        </p:nvSpPr>
+        <p:spPr>
+          <a:xfrm>
+            <a:off x="2355041" y="4693623"/>
+            <a:ext cx="310896" cy="224881"/>
+          </a:xfrm>
+          <a:prstGeom prst="roundRect">
+            <a:avLst/>
+          </a:prstGeom>
+          <a:solidFill>
+            <a:schemeClr val="tx2">
+              <a:lumMod val="10000"/>
+              <a:lumOff val="90000"/>
+            </a:schemeClr>
+          </a:solidFill>
+          <a:ln>
+            <a:noFill/>
+          </a:ln>
+        </p:spPr>
+        <p:style>
+          <a:lnRef idx="2">
+            <a:schemeClr val="accent1">
+              <a:shade val="15000"/>
+            </a:schemeClr>
+          </a:lnRef>
+          <a:fillRef idx="1">
+            <a:schemeClr val="accent1"/>
+          </a:fillRef>
+          <a:effectRef idx="0">
+            <a:schemeClr val="accent1"/>
+          </a:effectRef>
+          <a:fontRef idx="minor">
+            <a:schemeClr val="lt1"/>
+          </a:fontRef>
+        </p:style>
+        <p:txBody>
+          <a:bodyPr rtlCol="0" anchor="ctr"/>
+          <a:lstStyle/>
+          <a:p>
+            <a:pPr algn="ctr"/>
+            <a:r>
+              <a:rPr lang="en-US" dirty="0"/>
+              <a:t>+</a:t>
+            </a:r>
+          </a:p>
+        </p:txBody>
+      </p:sp>
+      <p:sp>
+        <p:nvSpPr>
+          <p:cNvPr id="247" name="TextBox 246">
+            <a:extLst>
+              <a:ext uri="{FF2B5EF4-FFF2-40B4-BE49-F238E27FC236}">
+                <a16:creationId xmlns:a16="http://schemas.microsoft.com/office/drawing/2014/main" id="{8ABB57A6-EFA5-184A-DCF6-99120E07DA91}"/>
+              </a:ext>
+            </a:extLst>
+          </p:cNvPr>
+          <p:cNvSpPr txBox="1"/>
+          <p:nvPr/>
+        </p:nvSpPr>
+        <p:spPr>
+          <a:xfrm>
+            <a:off x="2123749" y="2323923"/>
+            <a:ext cx="314510" cy="276999"/>
+          </a:xfrm>
+          <a:prstGeom prst="rect">
+            <a:avLst/>
+          </a:prstGeom>
+          <a:noFill/>
+        </p:spPr>
+        <p:txBody>
+          <a:bodyPr wrap="none" rtlCol="0">
+            <a:spAutoFit/>
+          </a:bodyPr>
+          <a:lstStyle/>
+          <a:p>
+            <a:r>
+              <a:rPr lang="en-US" sz="1200" dirty="0"/>
+              <a:t>…</a:t>
+            </a:r>
+          </a:p>
+        </p:txBody>
+      </p:sp>
+      <p:sp>
+        <p:nvSpPr>
+          <p:cNvPr id="248" name="TextBox 247">
+            <a:extLst>
+              <a:ext uri="{FF2B5EF4-FFF2-40B4-BE49-F238E27FC236}">
+                <a16:creationId xmlns:a16="http://schemas.microsoft.com/office/drawing/2014/main" id="{7FA743B2-CABC-AB3D-F052-3CC76E5988F1}"/>
+              </a:ext>
+            </a:extLst>
+          </p:cNvPr>
+          <p:cNvSpPr txBox="1"/>
+          <p:nvPr/>
+        </p:nvSpPr>
+        <p:spPr>
+          <a:xfrm>
+            <a:off x="5314728" y="4336346"/>
+            <a:ext cx="314510" cy="276999"/>
+          </a:xfrm>
+          <a:prstGeom prst="rect">
+            <a:avLst/>
+          </a:prstGeom>
+          <a:noFill/>
+        </p:spPr>
+        <p:txBody>
+          <a:bodyPr wrap="none" rtlCol="0">
+            <a:spAutoFit/>
+          </a:bodyPr>
+          <a:lstStyle/>
+          <a:p>
+            <a:r>
+              <a:rPr lang="en-US" sz="1200" dirty="0"/>
+              <a:t>…</a:t>
+            </a:r>
+          </a:p>
+        </p:txBody>
+      </p:sp>
+      <p:cxnSp>
+        <p:nvCxnSpPr>
+          <p:cNvPr id="56" name="Curved Connector 55">
+            <a:extLst>
+              <a:ext uri="{FF2B5EF4-FFF2-40B4-BE49-F238E27FC236}">
+                <a16:creationId xmlns:a16="http://schemas.microsoft.com/office/drawing/2014/main" id="{7E39302D-4C04-E666-3961-50A2AA231D50}"/>
+              </a:ext>
+            </a:extLst>
+          </p:cNvPr>
+          <p:cNvCxnSpPr>
+            <a:cxnSpLocks/>
+          </p:cNvCxnSpPr>
+          <p:nvPr/>
+        </p:nvCxnSpPr>
+        <p:spPr>
+          <a:xfrm rot="5400000" flipH="1" flipV="1">
+            <a:off x="375162" y="4256220"/>
+            <a:ext cx="2315050" cy="621098"/>
+          </a:xfrm>
+          <a:prstGeom prst="curvedConnector3">
+            <a:avLst>
+              <a:gd name="adj1" fmla="val 17926"/>
+            </a:avLst>
+          </a:prstGeom>
+          <a:ln>
+            <a:tailEnd type="triangle"/>
+          </a:ln>
+        </p:spPr>
+        <p:style>
+          <a:lnRef idx="2">
+            <a:schemeClr val="accent1"/>
+          </a:lnRef>
+          <a:fillRef idx="0">
+            <a:schemeClr val="accent1"/>
+          </a:fillRef>
+          <a:effectRef idx="1">
+            <a:schemeClr val="accent1"/>
+          </a:effectRef>
+          <a:fontRef idx="minor">
+            <a:schemeClr val="tx1"/>
+          </a:fontRef>
+        </p:style>
+      </p:cxnSp>
+      <p:cxnSp>
+        <p:nvCxnSpPr>
+          <p:cNvPr id="64" name="Curved Connector 63">
+            <a:extLst>
+              <a:ext uri="{FF2B5EF4-FFF2-40B4-BE49-F238E27FC236}">
+                <a16:creationId xmlns:a16="http://schemas.microsoft.com/office/drawing/2014/main" id="{FCA17184-40A9-4874-B309-591B9D92B5F4}"/>
+              </a:ext>
+            </a:extLst>
+          </p:cNvPr>
+          <p:cNvCxnSpPr>
+            <a:cxnSpLocks/>
+            <a:stCxn id="61" idx="2"/>
+          </p:cNvCxnSpPr>
+          <p:nvPr/>
+        </p:nvCxnSpPr>
+        <p:spPr>
+          <a:xfrm rot="16200000" flipV="1">
+            <a:off x="1983470" y="3603140"/>
+            <a:ext cx="154024" cy="434492"/>
+          </a:xfrm>
+          <a:prstGeom prst="curvedConnector2">
+            <a:avLst/>
+          </a:prstGeom>
+          <a:ln w="6350">
+            <a:tailEnd type="diamond"/>
+          </a:ln>
+        </p:spPr>
+        <p:style>
+          <a:lnRef idx="2">
+            <a:schemeClr val="accent1"/>
+          </a:lnRef>
+          <a:fillRef idx="0">
+            <a:schemeClr val="accent1"/>
+          </a:fillRef>
+          <a:effectRef idx="1">
+            <a:schemeClr val="accent1"/>
+          </a:effectRef>
+          <a:fontRef idx="minor">
+            <a:schemeClr val="tx1"/>
+          </a:fontRef>
+        </p:style>
+      </p:cxnSp>
+      <p:cxnSp>
+        <p:nvCxnSpPr>
+          <p:cNvPr id="214" name="Curved Connector 213">
+            <a:extLst>
+              <a:ext uri="{FF2B5EF4-FFF2-40B4-BE49-F238E27FC236}">
+                <a16:creationId xmlns:a16="http://schemas.microsoft.com/office/drawing/2014/main" id="{FCE452CA-5AA3-D5F6-90A7-69C12CAFE0A7}"/>
+              </a:ext>
+            </a:extLst>
+          </p:cNvPr>
+          <p:cNvCxnSpPr>
+            <a:cxnSpLocks/>
+            <a:stCxn id="213" idx="2"/>
+          </p:cNvCxnSpPr>
+          <p:nvPr/>
+        </p:nvCxnSpPr>
+        <p:spPr>
+          <a:xfrm rot="16200000" flipV="1">
+            <a:off x="2071397" y="3428604"/>
+            <a:ext cx="250513" cy="706833"/>
+          </a:xfrm>
+          <a:prstGeom prst="curvedConnector2">
+            <a:avLst/>
+          </a:prstGeom>
+          <a:ln w="6350">
+            <a:tailEnd type="diamond"/>
+          </a:ln>
+        </p:spPr>
+        <p:style>
+          <a:lnRef idx="2">
+            <a:schemeClr val="accent1"/>
+          </a:lnRef>
+          <a:fillRef idx="0">
+            <a:schemeClr val="accent1"/>
+          </a:fillRef>
+          <a:effectRef idx="1">
+            <a:schemeClr val="accent1"/>
+          </a:effectRef>
+          <a:fontRef idx="minor">
+            <a:schemeClr val="tx1"/>
+          </a:fontRef>
+        </p:style>
+      </p:cxnSp>
     </p:spTree>
     <p:extLst>
       <p:ext uri="{BB962C8B-B14F-4D97-AF65-F5344CB8AC3E}">
         <p14:creationId xmlns:p14="http://schemas.microsoft.com/office/powerpoint/2010/main" val="1907081065"/>
+      </p:ext>
+    </p:extLst>
+  </p:cSld>
+  <p:clrMapOvr>
+    <a:masterClrMapping/>
+  </p:clrMapOvr>
+</p:sld>
+</file>
+
+<file path=ppt/slides/slide9.xml><?xml version="1.0" encoding="utf-8"?>
+<p:sld xmlns:a="http://schemas.openxmlformats.org/drawingml/2006/main" xmlns:r="http://schemas.openxmlformats.org/officeDocument/2006/relationships" xmlns:p="http://schemas.openxmlformats.org/presentationml/2006/main">
+  <p:cSld>
+    <p:spTree>
+      <p:nvGrpSpPr>
+        <p:cNvPr id="1" name=""/>
+        <p:cNvGrpSpPr/>
+        <p:nvPr/>
+      </p:nvGrpSpPr>
+      <p:grpSpPr>
+        <a:xfrm>
+          <a:off x="0" y="0"/>
+          <a:ext cx="0" cy="0"/>
+          <a:chOff x="0" y="0"/>
+          <a:chExt cx="0" cy="0"/>
+        </a:xfrm>
+      </p:grpSpPr>
+      <p:sp>
+        <p:nvSpPr>
+          <p:cNvPr id="2" name="Title 1">
+            <a:extLst>
+              <a:ext uri="{FF2B5EF4-FFF2-40B4-BE49-F238E27FC236}">
+                <a16:creationId xmlns:a16="http://schemas.microsoft.com/office/drawing/2014/main" id="{AC434D5B-32EC-AC83-5219-B6933074BEDC}"/>
+              </a:ext>
+            </a:extLst>
+          </p:cNvPr>
+          <p:cNvSpPr>
+            <a:spLocks noGrp="1"/>
+          </p:cNvSpPr>
+          <p:nvPr>
+            <p:ph type="title"/>
+          </p:nvPr>
+        </p:nvSpPr>
+        <p:spPr/>
+        <p:txBody>
+          <a:bodyPr/>
+          <a:lstStyle/>
+          <a:p>
+            <a:r>
+              <a:rPr lang="en-US" dirty="0"/>
+              <a:t>O-complexity vs classic Self-Attention</a:t>
+            </a:r>
+            <a:br>
+              <a:rPr lang="en-US" dirty="0"/>
+            </a:br>
+            <a:r>
+              <a:rPr lang="en-US" sz="2400" b="1" dirty="0"/>
+              <a:t>per layer</a:t>
+            </a:r>
+          </a:p>
+        </p:txBody>
+      </p:sp>
+      <p:sp>
+        <p:nvSpPr>
+          <p:cNvPr id="3" name="Content Placeholder 2">
+            <a:extLst>
+              <a:ext uri="{FF2B5EF4-FFF2-40B4-BE49-F238E27FC236}">
+                <a16:creationId xmlns:a16="http://schemas.microsoft.com/office/drawing/2014/main" id="{66C4896D-3F0C-EDAD-4F8F-73ABC907BF7D}"/>
+              </a:ext>
+            </a:extLst>
+          </p:cNvPr>
+          <p:cNvSpPr>
+            <a:spLocks noGrp="1"/>
+          </p:cNvSpPr>
+          <p:nvPr>
+            <p:ph idx="1"/>
+          </p:nvPr>
+        </p:nvSpPr>
+        <p:spPr/>
+        <p:txBody>
+          <a:bodyPr>
+            <a:normAutofit fontScale="92500" lnSpcReduction="10000"/>
+          </a:bodyPr>
+          <a:lstStyle/>
+          <a:p>
+            <a:r>
+              <a:rPr lang="en-US" dirty="0"/>
+              <a:t>Parameters:</a:t>
+            </a:r>
+          </a:p>
+          <a:p>
+            <a:pPr lvl="1"/>
+            <a:r>
+              <a:rPr lang="en-US" dirty="0"/>
+              <a:t>d: dimensionality</a:t>
+            </a:r>
+          </a:p>
+          <a:p>
+            <a:pPr lvl="1"/>
+            <a:r>
+              <a:rPr lang="en-US" dirty="0"/>
+              <a:t>s: seq (window size)</a:t>
+            </a:r>
+          </a:p>
+          <a:p>
+            <a:pPr lvl="1"/>
+            <a:r>
+              <a:rPr lang="en-US" dirty="0"/>
+              <a:t>c: number of conceptualizations</a:t>
+            </a:r>
+          </a:p>
+          <a:p>
+            <a:r>
+              <a:rPr lang="en-US" dirty="0"/>
+              <a:t>Classic Self Attention:</a:t>
+            </a:r>
+          </a:p>
+          <a:p>
+            <a:pPr lvl="1"/>
+            <a:r>
+              <a:rPr lang="en-US" dirty="0"/>
+              <a:t>O( s * d * d * 3 + d * s * s ) = O( s * d * d + d * s * s )</a:t>
+            </a:r>
+            <a:br>
+              <a:rPr lang="en-US" dirty="0"/>
+            </a:br>
+            <a:r>
+              <a:rPr lang="en-US" dirty="0"/>
+              <a:t>Wk, Wq, Wv + pairwise dot with dimensionality d</a:t>
+            </a:r>
+          </a:p>
+          <a:p>
+            <a:r>
+              <a:rPr lang="en-US" dirty="0"/>
+              <a:t>Conceptualized Self Attention:</a:t>
+            </a:r>
+          </a:p>
+          <a:p>
+            <a:pPr lvl="1"/>
+            <a:r>
+              <a:rPr lang="en-US" dirty="0"/>
+              <a:t>O( s * d * c +  s * c * d) = O( s* d * c )</a:t>
+            </a:r>
+            <a:br>
+              <a:rPr lang="en-US" dirty="0"/>
+            </a:br>
+            <a:r>
+              <a:rPr lang="en-US" dirty="0"/>
+              <a:t>conceptualizations + conceptualization-weighted values</a:t>
+            </a:r>
+          </a:p>
+          <a:p>
+            <a:pPr lvl="1"/>
+            <a:r>
+              <a:rPr lang="en-US" b="1" dirty="0"/>
+              <a:t>no s-squared</a:t>
+            </a:r>
+            <a:r>
+              <a:rPr lang="en-US" dirty="0"/>
+              <a:t>; replaced with s * c</a:t>
+            </a:r>
+            <a:br>
+              <a:rPr lang="en-US" dirty="0"/>
+            </a:br>
+            <a:r>
+              <a:rPr lang="en-US" dirty="0"/>
+              <a:t>no d-squared either</a:t>
+            </a:r>
+          </a:p>
+        </p:txBody>
+      </p:sp>
+    </p:spTree>
+    <p:extLst>
+      <p:ext uri="{BB962C8B-B14F-4D97-AF65-F5344CB8AC3E}">
+        <p14:creationId xmlns:p14="http://schemas.microsoft.com/office/powerpoint/2010/main" val="3110103710"/>
       </p:ext>
     </p:extLst>
   </p:cSld>

</xml_diff>

<commit_message>
trigram language as a double check
</commit_message>
<xml_diff>
--- a/notes/2024 12 25 experiment 2.pptx
+++ b/notes/2024 12 25 experiment 2.pptx
@@ -5,19 +5,20 @@
     <p:sldMasterId id="2147483648" r:id="rId1"/>
   </p:sldMasterIdLst>
   <p:notesMasterIdLst>
-    <p:notesMasterId r:id="rId12"/>
+    <p:notesMasterId r:id="rId13"/>
   </p:notesMasterIdLst>
   <p:sldIdLst>
     <p:sldId id="257" r:id="rId2"/>
     <p:sldId id="256" r:id="rId3"/>
     <p:sldId id="259" r:id="rId4"/>
-    <p:sldId id="258" r:id="rId5"/>
-    <p:sldId id="260" r:id="rId6"/>
-    <p:sldId id="264" r:id="rId7"/>
-    <p:sldId id="261" r:id="rId8"/>
-    <p:sldId id="262" r:id="rId9"/>
-    <p:sldId id="263" r:id="rId10"/>
-    <p:sldId id="265" r:id="rId11"/>
+    <p:sldId id="266" r:id="rId5"/>
+    <p:sldId id="258" r:id="rId6"/>
+    <p:sldId id="260" r:id="rId7"/>
+    <p:sldId id="264" r:id="rId8"/>
+    <p:sldId id="261" r:id="rId9"/>
+    <p:sldId id="262" r:id="rId10"/>
+    <p:sldId id="263" r:id="rId11"/>
+    <p:sldId id="265" r:id="rId12"/>
   </p:sldIdLst>
   <p:sldSz cx="12192000" cy="6858000"/>
   <p:notesSz cx="6858000" cy="9144000"/>
@@ -725,7 +726,7 @@
           <a:p>
             <a:fld id="{3098084A-C0FE-9240-A03A-0B24AAF4C80D}" type="slidenum">
               <a:rPr lang="en-US" smtClean="0"/>
-              <a:t>8</a:t>
+              <a:t>9</a:t>
             </a:fld>
             <a:endParaRPr lang="en-US"/>
           </a:p>
@@ -4114,7 +4115,7 @@
           <p:cNvPr id="2" name="Title 1">
             <a:extLst>
               <a:ext uri="{FF2B5EF4-FFF2-40B4-BE49-F238E27FC236}">
-                <a16:creationId xmlns:a16="http://schemas.microsoft.com/office/drawing/2014/main" id="{8F2BE2D4-C6F4-808B-ECF3-C4421A2A9F13}"/>
+                <a16:creationId xmlns:a16="http://schemas.microsoft.com/office/drawing/2014/main" id="{AC434D5B-32EC-AC83-5219-B6933074BEDC}"/>
               </a:ext>
             </a:extLst>
           </p:cNvPr>
@@ -4132,7 +4133,202 @@
           <a:p>
             <a:r>
               <a:rPr lang="en-US" dirty="0"/>
-              <a:t>Double check</a:t>
+              <a:t>O-complexity vs classic Self-Attention</a:t>
+            </a:r>
+            <a:br>
+              <a:rPr lang="en-US" dirty="0"/>
+            </a:br>
+            <a:r>
+              <a:rPr lang="en-US" sz="2400" b="1" dirty="0"/>
+              <a:t>per layer</a:t>
+            </a:r>
+          </a:p>
+        </p:txBody>
+      </p:sp>
+      <p:sp>
+        <p:nvSpPr>
+          <p:cNvPr id="3" name="Content Placeholder 2">
+            <a:extLst>
+              <a:ext uri="{FF2B5EF4-FFF2-40B4-BE49-F238E27FC236}">
+                <a16:creationId xmlns:a16="http://schemas.microsoft.com/office/drawing/2014/main" id="{66C4896D-3F0C-EDAD-4F8F-73ABC907BF7D}"/>
+              </a:ext>
+            </a:extLst>
+          </p:cNvPr>
+          <p:cNvSpPr>
+            <a:spLocks noGrp="1"/>
+          </p:cNvSpPr>
+          <p:nvPr>
+            <p:ph idx="1"/>
+          </p:nvPr>
+        </p:nvSpPr>
+        <p:spPr/>
+        <p:txBody>
+          <a:bodyPr>
+            <a:normAutofit fontScale="85000" lnSpcReduction="20000"/>
+          </a:bodyPr>
+          <a:lstStyle/>
+          <a:p>
+            <a:r>
+              <a:rPr lang="en-US" dirty="0"/>
+              <a:t>Parameters:</a:t>
+            </a:r>
+          </a:p>
+          <a:p>
+            <a:pPr lvl="1"/>
+            <a:r>
+              <a:rPr lang="en-US" dirty="0"/>
+              <a:t>d: dimensionality</a:t>
+            </a:r>
+          </a:p>
+          <a:p>
+            <a:pPr lvl="1"/>
+            <a:r>
+              <a:rPr lang="en-US" dirty="0"/>
+              <a:t>s: seq (window size)</a:t>
+            </a:r>
+          </a:p>
+          <a:p>
+            <a:pPr lvl="1"/>
+            <a:r>
+              <a:rPr lang="en-US" dirty="0"/>
+              <a:t>c: number of conceptualizations</a:t>
+            </a:r>
+          </a:p>
+          <a:p>
+            <a:r>
+              <a:rPr lang="en-US" dirty="0"/>
+              <a:t>Classic Self Attention:</a:t>
+            </a:r>
+          </a:p>
+          <a:p>
+            <a:pPr lvl="1"/>
+            <a:r>
+              <a:rPr lang="en-US" dirty="0"/>
+              <a:t>O( s * d * d * 3 + d * s * s ) = O( s * d * d + d * s * s )</a:t>
+            </a:r>
+            <a:br>
+              <a:rPr lang="en-US" dirty="0"/>
+            </a:br>
+            <a:r>
+              <a:rPr lang="en-US" dirty="0"/>
+              <a:t>Wk, Wq, Wv + pairwise dot with dimensionality d</a:t>
+            </a:r>
+          </a:p>
+          <a:p>
+            <a:r>
+              <a:rPr lang="en-US" dirty="0"/>
+              <a:t>Conceptualized Self Attention:</a:t>
+            </a:r>
+          </a:p>
+          <a:p>
+            <a:pPr lvl="1"/>
+            <a:r>
+              <a:rPr lang="en-US" dirty="0"/>
+              <a:t>O( s * d * c +  s * c * d) = O( s* d * c )</a:t>
+            </a:r>
+            <a:br>
+              <a:rPr lang="en-US" dirty="0"/>
+            </a:br>
+            <a:r>
+              <a:rPr lang="en-US" dirty="0"/>
+              <a:t>conceptualizations + conceptualization-weighted values</a:t>
+            </a:r>
+          </a:p>
+          <a:p>
+            <a:pPr lvl="1"/>
+            <a:r>
+              <a:rPr lang="en-US" b="1" dirty="0"/>
+              <a:t>no s-squared</a:t>
+            </a:r>
+            <a:r>
+              <a:rPr lang="en-US" dirty="0"/>
+              <a:t>; replaced with s * c</a:t>
+            </a:r>
+            <a:br>
+              <a:rPr lang="en-US" dirty="0"/>
+            </a:br>
+            <a:r>
+              <a:rPr lang="en-US" dirty="0"/>
+              <a:t>no d-squared either</a:t>
+            </a:r>
+          </a:p>
+          <a:p>
+            <a:pPr lvl="1"/>
+            <a:r>
+              <a:rPr lang="en-US" dirty="0"/>
+              <a:t>We aim for conceptualizations c to be significantly less than vocab size</a:t>
+            </a:r>
+          </a:p>
+          <a:p>
+            <a:pPr lvl="2"/>
+            <a:r>
+              <a:rPr lang="en-US" dirty="0"/>
+              <a:t>but if conceptualizations c is towards vocab size than this is worse</a:t>
+            </a:r>
+          </a:p>
+          <a:p>
+            <a:pPr lvl="2"/>
+            <a:r>
+              <a:rPr lang="en-US" dirty="0"/>
+              <a:t>also worth considering: DNA sequencing (small vocab, long context)</a:t>
+            </a:r>
+          </a:p>
+        </p:txBody>
+      </p:sp>
+    </p:spTree>
+    <p:extLst>
+      <p:ext uri="{BB962C8B-B14F-4D97-AF65-F5344CB8AC3E}">
+        <p14:creationId xmlns:p14="http://schemas.microsoft.com/office/powerpoint/2010/main" val="3110103710"/>
+      </p:ext>
+    </p:extLst>
+  </p:cSld>
+  <p:clrMapOvr>
+    <a:masterClrMapping/>
+  </p:clrMapOvr>
+</p:sld>
+</file>
+
+<file path=ppt/slides/slide11.xml><?xml version="1.0" encoding="utf-8"?>
+<p:sld xmlns:a="http://schemas.openxmlformats.org/drawingml/2006/main" xmlns:r="http://schemas.openxmlformats.org/officeDocument/2006/relationships" xmlns:p="http://schemas.openxmlformats.org/presentationml/2006/main">
+  <p:cSld>
+    <p:spTree>
+      <p:nvGrpSpPr>
+        <p:cNvPr id="1" name=""/>
+        <p:cNvGrpSpPr/>
+        <p:nvPr/>
+      </p:nvGrpSpPr>
+      <p:grpSpPr>
+        <a:xfrm>
+          <a:off x="0" y="0"/>
+          <a:ext cx="0" cy="0"/>
+          <a:chOff x="0" y="0"/>
+          <a:chExt cx="0" cy="0"/>
+        </a:xfrm>
+      </p:grpSpPr>
+      <p:sp>
+        <p:nvSpPr>
+          <p:cNvPr id="2" name="Title 1">
+            <a:extLst>
+              <a:ext uri="{FF2B5EF4-FFF2-40B4-BE49-F238E27FC236}">
+                <a16:creationId xmlns:a16="http://schemas.microsoft.com/office/drawing/2014/main" id="{8F2BE2D4-C6F4-808B-ECF3-C4421A2A9F13}"/>
+              </a:ext>
+            </a:extLst>
+          </p:cNvPr>
+          <p:cNvSpPr>
+            <a:spLocks noGrp="1"/>
+          </p:cNvSpPr>
+          <p:nvPr>
+            <p:ph type="title"/>
+          </p:nvPr>
+        </p:nvSpPr>
+        <p:spPr/>
+        <p:txBody>
+          <a:bodyPr/>
+          <a:lstStyle/>
+          <a:p>
+            <a:r>
+              <a:rPr lang="en-US" dirty="0"/>
+              <a:t>Counters</a:t>
             </a:r>
           </a:p>
         </p:txBody>
@@ -4167,7 +4363,7 @@
             <a:pPr lvl="1"/>
             <a:r>
               <a:rPr lang="en-US" dirty="0"/>
-              <a:t>yes because of the sigmoid</a:t>
+              <a:t>for sure not a convolution, for example because of the sigmoid</a:t>
             </a:r>
           </a:p>
         </p:txBody>
@@ -16735,7 +16931,7 @@
           <p:cNvPr id="2" name="Title 1">
             <a:extLst>
               <a:ext uri="{FF2B5EF4-FFF2-40B4-BE49-F238E27FC236}">
-                <a16:creationId xmlns:a16="http://schemas.microsoft.com/office/drawing/2014/main" id="{8BF470D1-4F99-8612-B6E6-1AE8D102D925}"/>
+                <a16:creationId xmlns:a16="http://schemas.microsoft.com/office/drawing/2014/main" id="{66395FFC-6E5F-CC8E-DF3A-AFCE46D0D4BA}"/>
               </a:ext>
             </a:extLst>
           </p:cNvPr>
@@ -16753,7 +16949,7 @@
           <a:p>
             <a:r>
               <a:rPr lang="en-US" dirty="0"/>
-              <a:t>How to fix - ideation</a:t>
+              <a:t>Issue observed</a:t>
             </a:r>
           </a:p>
         </p:txBody>
@@ -16763,7 +16959,7 @@
           <p:cNvPr id="3" name="Content Placeholder 2">
             <a:extLst>
               <a:ext uri="{FF2B5EF4-FFF2-40B4-BE49-F238E27FC236}">
-                <a16:creationId xmlns:a16="http://schemas.microsoft.com/office/drawing/2014/main" id="{C053CFAD-7BB6-5062-DD25-32343272AA42}"/>
+                <a16:creationId xmlns:a16="http://schemas.microsoft.com/office/drawing/2014/main" id="{9E431F18-A2FF-01D4-70A3-BD39B1D0A29A}"/>
               </a:ext>
             </a:extLst>
           </p:cNvPr>
@@ -16781,34 +16977,7 @@
           <a:p>
             <a:r>
               <a:rPr lang="en-US" dirty="0"/>
-              <a:t>? warm up for a few iterations, then take unions of attentions</a:t>
-            </a:r>
-          </a:p>
-          <a:p>
-            <a:r>
-              <a:rPr lang="en-US" dirty="0"/>
-              <a:t>multi-head, by groups. Take union of groups of attentions. When attentions develop to &gt;0.5, start phase out all but 1 head in such groups each group</a:t>
-            </a:r>
-          </a:p>
-          <a:p>
-            <a:pPr lvl="1"/>
-            <a:r>
-              <a:rPr lang="en-US" dirty="0"/>
-              <a:t>intuition:</a:t>
-            </a:r>
-          </a:p>
-          <a:p>
-            <a:pPr lvl="2"/>
-            <a:r>
-              <a:rPr lang="en-US" dirty="0"/>
-              <a:t>in the initial, warmup phase all information paths will develop in all heads because of the union of attentions</a:t>
-            </a:r>
-          </a:p>
-          <a:p>
-            <a:pPr lvl="2"/>
-            <a:r>
-              <a:rPr lang="en-US" dirty="0"/>
-              <a:t>Once strong, consistent attentions develop, start gradual phase out by shifting “weight” onto 1 head in the group. Once it develops self-sufficiency (no dependency on other group), other groups can be removed.</a:t>
+              <a:t>Inconsistent representation of tokens 1 and 2: sometimes attentions split, and sometimes not</a:t>
             </a:r>
           </a:p>
         </p:txBody>
@@ -16816,7 +16985,7 @@
     </p:spTree>
     <p:extLst>
       <p:ext uri="{BB962C8B-B14F-4D97-AF65-F5344CB8AC3E}">
-        <p14:creationId xmlns:p14="http://schemas.microsoft.com/office/powerpoint/2010/main" val="155105084"/>
+        <p14:creationId xmlns:p14="http://schemas.microsoft.com/office/powerpoint/2010/main" val="2979589284"/>
       </p:ext>
     </p:extLst>
   </p:cSld>
@@ -16848,7 +17017,7 @@
           <p:cNvPr id="2" name="Title 1">
             <a:extLst>
               <a:ext uri="{FF2B5EF4-FFF2-40B4-BE49-F238E27FC236}">
-                <a16:creationId xmlns:a16="http://schemas.microsoft.com/office/drawing/2014/main" id="{FFF0D012-8030-0256-46A2-610B2F461FFE}"/>
+                <a16:creationId xmlns:a16="http://schemas.microsoft.com/office/drawing/2014/main" id="{8BF470D1-4F99-8612-B6E6-1AE8D102D925}"/>
               </a:ext>
             </a:extLst>
           </p:cNvPr>
@@ -16861,21 +17030,12 @@
         </p:nvSpPr>
         <p:spPr/>
         <p:txBody>
-          <a:bodyPr>
-            <a:normAutofit fontScale="90000"/>
-          </a:bodyPr>
+          <a:bodyPr/>
           <a:lstStyle/>
           <a:p>
             <a:r>
               <a:rPr lang="en-US" dirty="0"/>
-              <a:t>Experiment 2b:</a:t>
-            </a:r>
-            <a:br>
-              <a:rPr lang="en-US" dirty="0"/>
-            </a:br>
-            <a:r>
-              <a:rPr lang="en-US" dirty="0"/>
-              <a:t>Temperature-annealed softmax in attention mechanism of Transformers</a:t>
+              <a:t>How to fix - ideation</a:t>
             </a:r>
           </a:p>
         </p:txBody>
@@ -16885,7 +17045,7 @@
           <p:cNvPr id="3" name="Content Placeholder 2">
             <a:extLst>
               <a:ext uri="{FF2B5EF4-FFF2-40B4-BE49-F238E27FC236}">
-                <a16:creationId xmlns:a16="http://schemas.microsoft.com/office/drawing/2014/main" id="{E3DA3AE6-C94F-891D-EB6E-023AC003878B}"/>
+                <a16:creationId xmlns:a16="http://schemas.microsoft.com/office/drawing/2014/main" id="{C053CFAD-7BB6-5062-DD25-32343272AA42}"/>
               </a:ext>
             </a:extLst>
           </p:cNvPr>
@@ -16903,27 +17063,34 @@
           <a:p>
             <a:r>
               <a:rPr lang="en-US" dirty="0"/>
-              <a:t>Basic idea: start with small temperatures (to allow all information flow paths ”develop”)</a:t>
+              <a:t>? warm up for a few iterations, then take unions of attentions</a:t>
             </a:r>
           </a:p>
           <a:p>
             <a:r>
               <a:rPr lang="en-US" dirty="0"/>
-              <a:t>Anneal temperature towards typical e value (to allow “the commitment” to develop) as loss reduces</a:t>
+              <a:t>multi-head, by groups. Take union of groups of attentions. When attentions develop to &gt;0.5, start phase out all but 1 head in such groups each group</a:t>
             </a:r>
           </a:p>
           <a:p>
+            <a:pPr lvl="1"/>
             <a:r>
               <a:rPr lang="en-US" dirty="0"/>
-              <a:t>Implemented as `soft-temperature-loss-guided` and `soft-temperature-loss-guided-2` modes in `</a:t>
+              <a:t>intuition:</a:t>
             </a:r>
-            <a:r>
-              <a:rPr lang="en-US" dirty="0" err="1"/>
-              <a:t>SelfAttention</a:t>
-            </a:r>
+          </a:p>
+          <a:p>
+            <a:pPr lvl="2"/>
             <a:r>
               <a:rPr lang="en-US" dirty="0"/>
-              <a:t>`</a:t>
+              <a:t>in the initial, warmup phase all information paths will develop in all heads because of the union of attentions</a:t>
+            </a:r>
+          </a:p>
+          <a:p>
+            <a:pPr lvl="2"/>
+            <a:r>
+              <a:rPr lang="en-US" dirty="0"/>
+              <a:t>Once strong, consistent attentions develop, start gradual phase out by shifting “weight” onto 1 head in the group. Once it develops self-sufficiency (no dependency on other group), other groups can be removed.</a:t>
             </a:r>
           </a:p>
         </p:txBody>
@@ -16931,7 +17098,7 @@
     </p:spTree>
     <p:extLst>
       <p:ext uri="{BB962C8B-B14F-4D97-AF65-F5344CB8AC3E}">
-        <p14:creationId xmlns:p14="http://schemas.microsoft.com/office/powerpoint/2010/main" val="3385559455"/>
+        <p14:creationId xmlns:p14="http://schemas.microsoft.com/office/powerpoint/2010/main" val="155105084"/>
       </p:ext>
     </p:extLst>
   </p:cSld>
@@ -16963,7 +17130,7 @@
           <p:cNvPr id="2" name="Title 1">
             <a:extLst>
               <a:ext uri="{FF2B5EF4-FFF2-40B4-BE49-F238E27FC236}">
-                <a16:creationId xmlns:a16="http://schemas.microsoft.com/office/drawing/2014/main" id="{3E316CE9-B73B-0317-BAB4-8478B5BA0C14}"/>
+                <a16:creationId xmlns:a16="http://schemas.microsoft.com/office/drawing/2014/main" id="{FFF0D012-8030-0256-46A2-610B2F461FFE}"/>
               </a:ext>
             </a:extLst>
           </p:cNvPr>
@@ -16976,19 +17143,69 @@
         </p:nvSpPr>
         <p:spPr/>
         <p:txBody>
-          <a:bodyPr/>
+          <a:bodyPr>
+            <a:normAutofit fontScale="90000"/>
+          </a:bodyPr>
           <a:lstStyle/>
           <a:p>
             <a:r>
               <a:rPr lang="en-US" dirty="0"/>
-              <a:t>Experiment 2c:</a:t>
+              <a:t>Experiment 2b:</a:t>
             </a:r>
             <a:br>
               <a:rPr lang="en-US" dirty="0"/>
             </a:br>
             <a:r>
               <a:rPr lang="en-US" dirty="0"/>
-              <a:t>“Conceptualized Attention” - exploration</a:t>
+              <a:t>Temperature-annealed softmax in attention mechanism of Transformers</a:t>
+            </a:r>
+          </a:p>
+        </p:txBody>
+      </p:sp>
+      <p:sp>
+        <p:nvSpPr>
+          <p:cNvPr id="3" name="Content Placeholder 2">
+            <a:extLst>
+              <a:ext uri="{FF2B5EF4-FFF2-40B4-BE49-F238E27FC236}">
+                <a16:creationId xmlns:a16="http://schemas.microsoft.com/office/drawing/2014/main" id="{E3DA3AE6-C94F-891D-EB6E-023AC003878B}"/>
+              </a:ext>
+            </a:extLst>
+          </p:cNvPr>
+          <p:cNvSpPr>
+            <a:spLocks noGrp="1"/>
+          </p:cNvSpPr>
+          <p:nvPr>
+            <p:ph idx="1"/>
+          </p:nvPr>
+        </p:nvSpPr>
+        <p:spPr/>
+        <p:txBody>
+          <a:bodyPr/>
+          <a:lstStyle/>
+          <a:p>
+            <a:r>
+              <a:rPr lang="en-US" dirty="0"/>
+              <a:t>Basic idea: start with small temperatures (to allow all information flow paths ”develop”)</a:t>
+            </a:r>
+          </a:p>
+          <a:p>
+            <a:r>
+              <a:rPr lang="en-US" dirty="0"/>
+              <a:t>Anneal temperature towards typical e value (to allow “the commitment” to develop) as loss reduces</a:t>
+            </a:r>
+          </a:p>
+          <a:p>
+            <a:r>
+              <a:rPr lang="en-US" dirty="0"/>
+              <a:t>Implemented as `soft-temperature-loss-guided` and `soft-temperature-loss-guided-2` modes in `</a:t>
+            </a:r>
+            <a:r>
+              <a:rPr lang="en-US" dirty="0" err="1"/>
+              <a:t>SelfAttention</a:t>
+            </a:r>
+            <a:r>
+              <a:rPr lang="en-US" dirty="0"/>
+              <a:t>`</a:t>
             </a:r>
           </a:p>
         </p:txBody>
@@ -16996,7 +17213,7 @@
     </p:spTree>
     <p:extLst>
       <p:ext uri="{BB962C8B-B14F-4D97-AF65-F5344CB8AC3E}">
-        <p14:creationId xmlns:p14="http://schemas.microsoft.com/office/powerpoint/2010/main" val="3692323239"/>
+        <p14:creationId xmlns:p14="http://schemas.microsoft.com/office/powerpoint/2010/main" val="3385559455"/>
       </p:ext>
     </p:extLst>
   </p:cSld>
@@ -17028,6 +17245,71 @@
           <p:cNvPr id="2" name="Title 1">
             <a:extLst>
               <a:ext uri="{FF2B5EF4-FFF2-40B4-BE49-F238E27FC236}">
+                <a16:creationId xmlns:a16="http://schemas.microsoft.com/office/drawing/2014/main" id="{3E316CE9-B73B-0317-BAB4-8478B5BA0C14}"/>
+              </a:ext>
+            </a:extLst>
+          </p:cNvPr>
+          <p:cNvSpPr>
+            <a:spLocks noGrp="1"/>
+          </p:cNvSpPr>
+          <p:nvPr>
+            <p:ph type="title"/>
+          </p:nvPr>
+        </p:nvSpPr>
+        <p:spPr/>
+        <p:txBody>
+          <a:bodyPr/>
+          <a:lstStyle/>
+          <a:p>
+            <a:r>
+              <a:rPr lang="en-US" dirty="0"/>
+              <a:t>Experiment 2c:</a:t>
+            </a:r>
+            <a:br>
+              <a:rPr lang="en-US" dirty="0"/>
+            </a:br>
+            <a:r>
+              <a:rPr lang="en-US" dirty="0"/>
+              <a:t>“Conceptualized Attention” - exploration</a:t>
+            </a:r>
+          </a:p>
+        </p:txBody>
+      </p:sp>
+    </p:spTree>
+    <p:extLst>
+      <p:ext uri="{BB962C8B-B14F-4D97-AF65-F5344CB8AC3E}">
+        <p14:creationId xmlns:p14="http://schemas.microsoft.com/office/powerpoint/2010/main" val="3692323239"/>
+      </p:ext>
+    </p:extLst>
+  </p:cSld>
+  <p:clrMapOvr>
+    <a:masterClrMapping/>
+  </p:clrMapOvr>
+</p:sld>
+</file>
+
+<file path=ppt/slides/slide8.xml><?xml version="1.0" encoding="utf-8"?>
+<p:sld xmlns:a="http://schemas.openxmlformats.org/drawingml/2006/main" xmlns:r="http://schemas.openxmlformats.org/officeDocument/2006/relationships" xmlns:p="http://schemas.openxmlformats.org/presentationml/2006/main">
+  <p:cSld>
+    <p:spTree>
+      <p:nvGrpSpPr>
+        <p:cNvPr id="1" name=""/>
+        <p:cNvGrpSpPr/>
+        <p:nvPr/>
+      </p:nvGrpSpPr>
+      <p:grpSpPr>
+        <a:xfrm>
+          <a:off x="0" y="0"/>
+          <a:ext cx="0" cy="0"/>
+          <a:chOff x="0" y="0"/>
+          <a:chExt cx="0" cy="0"/>
+        </a:xfrm>
+      </p:grpSpPr>
+      <p:sp>
+        <p:nvSpPr>
+          <p:cNvPr id="2" name="Title 1">
+            <a:extLst>
+              <a:ext uri="{FF2B5EF4-FFF2-40B4-BE49-F238E27FC236}">
                 <a16:creationId xmlns:a16="http://schemas.microsoft.com/office/drawing/2014/main" id="{033B4EEC-9120-98A4-6323-8DA1DAA4A79E}"/>
               </a:ext>
             </a:extLst>
@@ -17139,7 +17421,7 @@
 </p:sld>
 </file>
 
-<file path=ppt/slides/slide8.xml><?xml version="1.0" encoding="utf-8"?>
+<file path=ppt/slides/slide9.xml><?xml version="1.0" encoding="utf-8"?>
 <p:sld xmlns:a="http://schemas.openxmlformats.org/drawingml/2006/main" xmlns:r="http://schemas.openxmlformats.org/officeDocument/2006/relationships" xmlns:p="http://schemas.openxmlformats.org/presentationml/2006/main">
   <p:cSld>
     <p:spTree>
@@ -20934,212 +21216,6 @@
     <p:extLst>
       <p:ext uri="{BB962C8B-B14F-4D97-AF65-F5344CB8AC3E}">
         <p14:creationId xmlns:p14="http://schemas.microsoft.com/office/powerpoint/2010/main" val="1907081065"/>
-      </p:ext>
-    </p:extLst>
-  </p:cSld>
-  <p:clrMapOvr>
-    <a:masterClrMapping/>
-  </p:clrMapOvr>
-</p:sld>
-</file>
-
-<file path=ppt/slides/slide9.xml><?xml version="1.0" encoding="utf-8"?>
-<p:sld xmlns:a="http://schemas.openxmlformats.org/drawingml/2006/main" xmlns:r="http://schemas.openxmlformats.org/officeDocument/2006/relationships" xmlns:p="http://schemas.openxmlformats.org/presentationml/2006/main">
-  <p:cSld>
-    <p:spTree>
-      <p:nvGrpSpPr>
-        <p:cNvPr id="1" name=""/>
-        <p:cNvGrpSpPr/>
-        <p:nvPr/>
-      </p:nvGrpSpPr>
-      <p:grpSpPr>
-        <a:xfrm>
-          <a:off x="0" y="0"/>
-          <a:ext cx="0" cy="0"/>
-          <a:chOff x="0" y="0"/>
-          <a:chExt cx="0" cy="0"/>
-        </a:xfrm>
-      </p:grpSpPr>
-      <p:sp>
-        <p:nvSpPr>
-          <p:cNvPr id="2" name="Title 1">
-            <a:extLst>
-              <a:ext uri="{FF2B5EF4-FFF2-40B4-BE49-F238E27FC236}">
-                <a16:creationId xmlns:a16="http://schemas.microsoft.com/office/drawing/2014/main" id="{AC434D5B-32EC-AC83-5219-B6933074BEDC}"/>
-              </a:ext>
-            </a:extLst>
-          </p:cNvPr>
-          <p:cNvSpPr>
-            <a:spLocks noGrp="1"/>
-          </p:cNvSpPr>
-          <p:nvPr>
-            <p:ph type="title"/>
-          </p:nvPr>
-        </p:nvSpPr>
-        <p:spPr/>
-        <p:txBody>
-          <a:bodyPr/>
-          <a:lstStyle/>
-          <a:p>
-            <a:r>
-              <a:rPr lang="en-US" dirty="0"/>
-              <a:t>O-complexity vs classic Self-Attention</a:t>
-            </a:r>
-            <a:br>
-              <a:rPr lang="en-US" dirty="0"/>
-            </a:br>
-            <a:r>
-              <a:rPr lang="en-US" sz="2400" b="1" dirty="0"/>
-              <a:t>per layer</a:t>
-            </a:r>
-          </a:p>
-        </p:txBody>
-      </p:sp>
-      <p:sp>
-        <p:nvSpPr>
-          <p:cNvPr id="3" name="Content Placeholder 2">
-            <a:extLst>
-              <a:ext uri="{FF2B5EF4-FFF2-40B4-BE49-F238E27FC236}">
-                <a16:creationId xmlns:a16="http://schemas.microsoft.com/office/drawing/2014/main" id="{66C4896D-3F0C-EDAD-4F8F-73ABC907BF7D}"/>
-              </a:ext>
-            </a:extLst>
-          </p:cNvPr>
-          <p:cNvSpPr>
-            <a:spLocks noGrp="1"/>
-          </p:cNvSpPr>
-          <p:nvPr>
-            <p:ph idx="1"/>
-          </p:nvPr>
-        </p:nvSpPr>
-        <p:spPr/>
-        <p:txBody>
-          <a:bodyPr>
-            <a:normAutofit fontScale="77500" lnSpcReduction="20000"/>
-          </a:bodyPr>
-          <a:lstStyle/>
-          <a:p>
-            <a:r>
-              <a:rPr lang="en-US" dirty="0"/>
-              <a:t>Parameters:</a:t>
-            </a:r>
-          </a:p>
-          <a:p>
-            <a:pPr lvl="1"/>
-            <a:r>
-              <a:rPr lang="en-US" dirty="0"/>
-              <a:t>d: dimensionality</a:t>
-            </a:r>
-          </a:p>
-          <a:p>
-            <a:pPr lvl="1"/>
-            <a:r>
-              <a:rPr lang="en-US" dirty="0"/>
-              <a:t>s: seq (window size)</a:t>
-            </a:r>
-          </a:p>
-          <a:p>
-            <a:pPr lvl="1"/>
-            <a:r>
-              <a:rPr lang="en-US" dirty="0"/>
-              <a:t>c: number of conceptualizations</a:t>
-            </a:r>
-          </a:p>
-          <a:p>
-            <a:r>
-              <a:rPr lang="en-US" dirty="0"/>
-              <a:t>Classic Self Attention:</a:t>
-            </a:r>
-          </a:p>
-          <a:p>
-            <a:pPr lvl="1"/>
-            <a:r>
-              <a:rPr lang="en-US" dirty="0"/>
-              <a:t>O( s * d * d * 3 + d * s * s ) = O( s * d * d + d * s * s )</a:t>
-            </a:r>
-            <a:br>
-              <a:rPr lang="en-US" dirty="0"/>
-            </a:br>
-            <a:r>
-              <a:rPr lang="en-US" dirty="0"/>
-              <a:t>Wk, Wq, Wv + pairwise dot with dimensionality d</a:t>
-            </a:r>
-          </a:p>
-          <a:p>
-            <a:r>
-              <a:rPr lang="en-US" dirty="0"/>
-              <a:t>Conceptualized Self Attention:</a:t>
-            </a:r>
-          </a:p>
-          <a:p>
-            <a:pPr lvl="1"/>
-            <a:r>
-              <a:rPr lang="en-US" dirty="0"/>
-              <a:t>O( s * d * c +  s * c * d) = O( s* d * c )</a:t>
-            </a:r>
-            <a:br>
-              <a:rPr lang="en-US" dirty="0"/>
-            </a:br>
-            <a:r>
-              <a:rPr lang="en-US" dirty="0"/>
-              <a:t>conceptualizations + conceptualization-weighted values</a:t>
-            </a:r>
-          </a:p>
-          <a:p>
-            <a:pPr lvl="1"/>
-            <a:r>
-              <a:rPr lang="en-US" b="1" dirty="0"/>
-              <a:t>no s-squared</a:t>
-            </a:r>
-            <a:r>
-              <a:rPr lang="en-US" dirty="0"/>
-              <a:t>; replaced with s * c</a:t>
-            </a:r>
-            <a:br>
-              <a:rPr lang="en-US" dirty="0"/>
-            </a:br>
-            <a:r>
-              <a:rPr lang="en-US" dirty="0"/>
-              <a:t>no d-squared either</a:t>
-            </a:r>
-          </a:p>
-          <a:p>
-            <a:pPr lvl="1"/>
-            <a:r>
-              <a:rPr lang="en-US" dirty="0"/>
-              <a:t>if conceptualizations c is towards vocab size this is worse;</a:t>
-            </a:r>
-            <a:br>
-              <a:rPr lang="en-US" dirty="0"/>
-            </a:br>
-            <a:r>
-              <a:rPr lang="en-US" dirty="0"/>
-              <a:t>if less than context size: better</a:t>
-            </a:r>
-          </a:p>
-          <a:p>
-            <a:pPr lvl="2"/>
-            <a:r>
-              <a:rPr lang="en-US" dirty="0"/>
-              <a:t>Do we need this to be ~ vocab size? Can it be </a:t>
-            </a:r>
-            <a:r>
-              <a:rPr lang="en-US"/>
-              <a:t>much smaller?</a:t>
-            </a:r>
-          </a:p>
-          <a:p>
-            <a:pPr lvl="2"/>
-            <a:r>
-              <a:rPr lang="en-US" dirty="0"/>
-              <a:t>consider: DNA sequencing (small vocab, long context)</a:t>
-            </a:r>
-          </a:p>
-        </p:txBody>
-      </p:sp>
-    </p:spTree>
-    <p:extLst>
-      <p:ext uri="{BB962C8B-B14F-4D97-AF65-F5344CB8AC3E}">
-        <p14:creationId xmlns:p14="http://schemas.microsoft.com/office/powerpoint/2010/main" val="3110103710"/>
       </p:ext>
     </p:extLst>
   </p:cSld>

</xml_diff>